<commit_message>
revised overview for this wild and crazy year
</commit_message>
<xml_diff>
--- a/Capstone547_Overview.pptx
+++ b/Capstone547_Overview.pptx
@@ -5,20 +5,15 @@
     <p:sldMasterId id="2147483648" r:id="rId1"/>
   </p:sldMasterIdLst>
   <p:notesMasterIdLst>
-    <p:notesMasterId r:id="rId13"/>
+    <p:notesMasterId r:id="rId8"/>
   </p:notesMasterIdLst>
   <p:sldIdLst>
-    <p:sldId id="256" r:id="rId2"/>
-    <p:sldId id="295" r:id="rId3"/>
-    <p:sldId id="296" r:id="rId4"/>
-    <p:sldId id="303" r:id="rId5"/>
-    <p:sldId id="297" r:id="rId6"/>
-    <p:sldId id="299" r:id="rId7"/>
-    <p:sldId id="306" r:id="rId8"/>
-    <p:sldId id="307" r:id="rId9"/>
-    <p:sldId id="305" r:id="rId10"/>
-    <p:sldId id="308" r:id="rId11"/>
-    <p:sldId id="302" r:id="rId12"/>
+    <p:sldId id="295" r:id="rId2"/>
+    <p:sldId id="296" r:id="rId3"/>
+    <p:sldId id="307" r:id="rId4"/>
+    <p:sldId id="309" r:id="rId5"/>
+    <p:sldId id="305" r:id="rId6"/>
+    <p:sldId id="308" r:id="rId7"/>
   </p:sldIdLst>
   <p:sldSz cx="9144000" cy="6858000" type="screen4x3"/>
   <p:notesSz cx="6858000" cy="9144000"/>
@@ -235,7 +230,7 @@
           <a:p>
             <a:fld id="{08F62E20-B1AA-3442-B8F1-F4A56998389D}" type="datetimeFigureOut">
               <a:rPr lang="en-US" smtClean="0"/>
-              <a:t>4/3/19</a:t>
+              <a:t>4/1/20</a:t>
             </a:fld>
             <a:endParaRPr lang="en-US"/>
           </a:p>
@@ -299,38 +294,37 @@
           <a:p>
             <a:pPr lvl="0"/>
             <a:r>
-              <a:rPr lang="en-US" smtClean="0"/>
+              <a:rPr lang="en-US"/>
               <a:t>Click to edit Master text styles</a:t>
             </a:r>
           </a:p>
           <a:p>
             <a:pPr lvl="1"/>
             <a:r>
-              <a:rPr lang="en-US" smtClean="0"/>
+              <a:rPr lang="en-US"/>
               <a:t>Second level</a:t>
             </a:r>
           </a:p>
           <a:p>
             <a:pPr lvl="2"/>
             <a:r>
-              <a:rPr lang="en-US" smtClean="0"/>
+              <a:rPr lang="en-US"/>
               <a:t>Third level</a:t>
             </a:r>
           </a:p>
           <a:p>
             <a:pPr lvl="3"/>
             <a:r>
-              <a:rPr lang="en-US" smtClean="0"/>
+              <a:rPr lang="en-US"/>
               <a:t>Fourth level</a:t>
             </a:r>
           </a:p>
           <a:p>
             <a:pPr lvl="4"/>
             <a:r>
-              <a:rPr lang="en-US" smtClean="0"/>
+              <a:rPr lang="en-US"/>
               <a:t>Fifth level</a:t>
             </a:r>
-            <a:endParaRPr lang="en-US"/>
           </a:p>
         </p:txBody>
       </p:sp>
@@ -503,196 +497,6 @@
 </p:notesMaster>
 </file>
 
-<file path=ppt/notesSlides/notesSlide1.xml><?xml version="1.0" encoding="utf-8"?>
-<p:notes xmlns:a="http://schemas.openxmlformats.org/drawingml/2006/main" xmlns:r="http://schemas.openxmlformats.org/officeDocument/2006/relationships" xmlns:p="http://schemas.openxmlformats.org/presentationml/2006/main">
-  <p:cSld>
-    <p:spTree>
-      <p:nvGrpSpPr>
-        <p:cNvPr id="1" name=""/>
-        <p:cNvGrpSpPr/>
-        <p:nvPr/>
-      </p:nvGrpSpPr>
-      <p:grpSpPr>
-        <a:xfrm>
-          <a:off x="0" y="0"/>
-          <a:ext cx="0" cy="0"/>
-          <a:chOff x="0" y="0"/>
-          <a:chExt cx="0" cy="0"/>
-        </a:xfrm>
-      </p:grpSpPr>
-      <p:sp>
-        <p:nvSpPr>
-          <p:cNvPr id="2" name="Slide Image Placeholder 1"/>
-          <p:cNvSpPr>
-            <a:spLocks noGrp="1" noRot="1" noChangeAspect="1"/>
-          </p:cNvSpPr>
-          <p:nvPr>
-            <p:ph type="sldImg"/>
-          </p:nvPr>
-        </p:nvSpPr>
-        <p:spPr/>
-      </p:sp>
-      <p:sp>
-        <p:nvSpPr>
-          <p:cNvPr id="3" name="Notes Placeholder 2"/>
-          <p:cNvSpPr>
-            <a:spLocks noGrp="1"/>
-          </p:cNvSpPr>
-          <p:nvPr>
-            <p:ph type="body" idx="1"/>
-          </p:nvPr>
-        </p:nvSpPr>
-        <p:spPr/>
-        <p:txBody>
-          <a:bodyPr/>
-          <a:lstStyle/>
-          <a:p>
-            <a:endParaRPr lang="en-US" dirty="0"/>
-          </a:p>
-        </p:txBody>
-      </p:sp>
-      <p:sp>
-        <p:nvSpPr>
-          <p:cNvPr id="4" name="Slide Number Placeholder 3"/>
-          <p:cNvSpPr>
-            <a:spLocks noGrp="1"/>
-          </p:cNvSpPr>
-          <p:nvPr>
-            <p:ph type="sldNum" sz="quarter" idx="10"/>
-          </p:nvPr>
-        </p:nvSpPr>
-        <p:spPr/>
-        <p:txBody>
-          <a:bodyPr/>
-          <a:lstStyle/>
-          <a:p>
-            <a:fld id="{90C4E4C1-AC8F-D74E-8D15-CAC414F5A92D}" type="slidenum">
-              <a:rPr lang="en-US" smtClean="0"/>
-              <a:t>1</a:t>
-            </a:fld>
-            <a:endParaRPr lang="en-US"/>
-          </a:p>
-        </p:txBody>
-      </p:sp>
-    </p:spTree>
-    <p:extLst>
-      <p:ext uri="{BB962C8B-B14F-4D97-AF65-F5344CB8AC3E}">
-        <p14:creationId xmlns:p14="http://schemas.microsoft.com/office/powerpoint/2010/main" val="2072873082"/>
-      </p:ext>
-    </p:extLst>
-  </p:cSld>
-  <p:clrMapOvr>
-    <a:masterClrMapping/>
-  </p:clrMapOvr>
-</p:notes>
-</file>
-
-<file path=ppt/notesSlides/notesSlide2.xml><?xml version="1.0" encoding="utf-8"?>
-<p:notes xmlns:a="http://schemas.openxmlformats.org/drawingml/2006/main" xmlns:r="http://schemas.openxmlformats.org/officeDocument/2006/relationships" xmlns:p="http://schemas.openxmlformats.org/presentationml/2006/main" showMasterSp="0" showMasterPhAnim="0">
-  <p:cSld>
-    <p:spTree>
-      <p:nvGrpSpPr>
-        <p:cNvPr id="1" name="Shape 408"/>
-        <p:cNvGrpSpPr/>
-        <p:nvPr/>
-      </p:nvGrpSpPr>
-      <p:grpSpPr>
-        <a:xfrm>
-          <a:off x="0" y="0"/>
-          <a:ext cx="0" cy="0"/>
-          <a:chOff x="0" y="0"/>
-          <a:chExt cx="0" cy="0"/>
-        </a:xfrm>
-      </p:grpSpPr>
-      <p:sp>
-        <p:nvSpPr>
-          <p:cNvPr id="409" name="Shape 409"/>
-          <p:cNvSpPr txBox="1">
-            <a:spLocks noGrp="1"/>
-          </p:cNvSpPr>
-          <p:nvPr>
-            <p:ph type="body" idx="1"/>
-          </p:nvPr>
-        </p:nvSpPr>
-        <p:spPr>
-          <a:xfrm>
-            <a:off x="685800" y="4343400"/>
-            <a:ext cx="5486399" cy="4114800"/>
-          </a:xfrm>
-          <a:prstGeom prst="rect">
-            <a:avLst/>
-          </a:prstGeom>
-        </p:spPr>
-        <p:txBody>
-          <a:bodyPr lIns="91425" tIns="91425" rIns="91425" bIns="91425" anchor="t" anchorCtr="0">
-            <a:noAutofit/>
-          </a:bodyPr>
-          <a:lstStyle/>
-          <a:p>
-            <a:pPr lvl="0">
-              <a:spcBef>
-                <a:spcPts val="0"/>
-              </a:spcBef>
-              <a:buNone/>
-            </a:pPr>
-            <a:endParaRPr/>
-          </a:p>
-        </p:txBody>
-      </p:sp>
-      <p:sp>
-        <p:nvSpPr>
-          <p:cNvPr id="410" name="Shape 410"/>
-          <p:cNvSpPr>
-            <a:spLocks noGrp="1" noRot="1" noChangeAspect="1"/>
-          </p:cNvSpPr>
-          <p:nvPr>
-            <p:ph type="sldImg" idx="2"/>
-          </p:nvPr>
-        </p:nvSpPr>
-        <p:spPr>
-          <a:xfrm>
-            <a:off x="1143000" y="685800"/>
-            <a:ext cx="4572000" cy="3429000"/>
-          </a:xfrm>
-          <a:custGeom>
-            <a:avLst/>
-            <a:gdLst/>
-            <a:ahLst/>
-            <a:cxnLst/>
-            <a:rect l="0" t="0" r="0" b="0"/>
-            <a:pathLst>
-              <a:path w="120000" h="120000" extrusionOk="0">
-                <a:moveTo>
-                  <a:pt x="0" y="0"/>
-                </a:moveTo>
-                <a:lnTo>
-                  <a:pt x="120000" y="0"/>
-                </a:lnTo>
-                <a:lnTo>
-                  <a:pt x="120000" y="120000"/>
-                </a:lnTo>
-                <a:lnTo>
-                  <a:pt x="0" y="120000"/>
-                </a:lnTo>
-                <a:close/>
-              </a:path>
-            </a:pathLst>
-          </a:custGeom>
-        </p:spPr>
-      </p:sp>
-    </p:spTree>
-    <p:extLst>
-      <p:ext uri="{BB962C8B-B14F-4D97-AF65-F5344CB8AC3E}">
-        <p14:creationId xmlns:p14="http://schemas.microsoft.com/office/powerpoint/2010/main" val="1729573160"/>
-      </p:ext>
-    </p:extLst>
-  </p:cSld>
-  <p:clrMapOvr>
-    <a:masterClrMapping/>
-  </p:clrMapOvr>
-</p:notes>
-</file>
-
 <file path=ppt/slideLayouts/slideLayout1.xml><?xml version="1.0" encoding="utf-8"?>
 <p:sldLayout xmlns:a="http://schemas.openxmlformats.org/drawingml/2006/main" xmlns:r="http://schemas.openxmlformats.org/officeDocument/2006/relationships" xmlns:p="http://schemas.openxmlformats.org/presentationml/2006/main" type="title" preserve="1">
   <p:cSld name="Title Slide">
@@ -731,10 +535,9 @@
           <a:lstStyle/>
           <a:p>
             <a:r>
-              <a:rPr lang="en-US" smtClean="0"/>
+              <a:rPr lang="en-US"/>
               <a:t>Click to edit Master title style</a:t>
             </a:r>
-            <a:endParaRPr lang="en-US"/>
           </a:p>
         </p:txBody>
       </p:sp>
@@ -850,10 +653,9 @@
           </a:lstStyle>
           <a:p>
             <a:r>
-              <a:rPr lang="en-US" smtClean="0"/>
+              <a:rPr lang="en-US"/>
               <a:t>Click to edit Master subtitle style</a:t>
             </a:r>
-            <a:endParaRPr lang="en-US"/>
           </a:p>
         </p:txBody>
       </p:sp>
@@ -882,7 +684,7 @@
           <a:p>
             <a:fld id="{2691D6E4-0F7A-0249-86EF-226720E50E4C}" type="datetimeFigureOut">
               <a:rPr lang="en-US" smtClean="0"/>
-              <a:t>4/3/19</a:t>
+              <a:t>4/1/20</a:t>
             </a:fld>
             <a:endParaRPr lang="en-US"/>
           </a:p>
@@ -992,10 +794,9 @@
           <a:lstStyle/>
           <a:p>
             <a:r>
-              <a:rPr lang="en-US" smtClean="0"/>
+              <a:rPr lang="en-US"/>
               <a:t>Click to edit Master title style</a:t>
             </a:r>
-            <a:endParaRPr lang="en-US"/>
           </a:p>
         </p:txBody>
       </p:sp>
@@ -1016,38 +817,37 @@
           <a:p>
             <a:pPr lvl="0"/>
             <a:r>
-              <a:rPr lang="en-US" smtClean="0"/>
+              <a:rPr lang="en-US"/>
               <a:t>Click to edit Master text styles</a:t>
             </a:r>
           </a:p>
           <a:p>
             <a:pPr lvl="1"/>
             <a:r>
-              <a:rPr lang="en-US" smtClean="0"/>
+              <a:rPr lang="en-US"/>
               <a:t>Second level</a:t>
             </a:r>
           </a:p>
           <a:p>
             <a:pPr lvl="2"/>
             <a:r>
-              <a:rPr lang="en-US" smtClean="0"/>
+              <a:rPr lang="en-US"/>
               <a:t>Third level</a:t>
             </a:r>
           </a:p>
           <a:p>
             <a:pPr lvl="3"/>
             <a:r>
-              <a:rPr lang="en-US" smtClean="0"/>
+              <a:rPr lang="en-US"/>
               <a:t>Fourth level</a:t>
             </a:r>
           </a:p>
           <a:p>
             <a:pPr lvl="4"/>
             <a:r>
-              <a:rPr lang="en-US" smtClean="0"/>
+              <a:rPr lang="en-US"/>
               <a:t>Fifth level</a:t>
             </a:r>
-            <a:endParaRPr lang="en-US"/>
           </a:p>
         </p:txBody>
       </p:sp>
@@ -1076,7 +876,7 @@
           <a:p>
             <a:fld id="{2691D6E4-0F7A-0249-86EF-226720E50E4C}" type="datetimeFigureOut">
               <a:rPr lang="en-US" smtClean="0"/>
-              <a:t>4/3/19</a:t>
+              <a:t>4/1/20</a:t>
             </a:fld>
             <a:endParaRPr lang="en-US"/>
           </a:p>
@@ -1191,10 +991,9 @@
           <a:lstStyle/>
           <a:p>
             <a:r>
-              <a:rPr lang="en-US" smtClean="0"/>
+              <a:rPr lang="en-US"/>
               <a:t>Click to edit Master title style</a:t>
             </a:r>
-            <a:endParaRPr lang="en-US"/>
           </a:p>
         </p:txBody>
       </p:sp>
@@ -1220,38 +1019,37 @@
           <a:p>
             <a:pPr lvl="0"/>
             <a:r>
-              <a:rPr lang="en-US" smtClean="0"/>
+              <a:rPr lang="en-US"/>
               <a:t>Click to edit Master text styles</a:t>
             </a:r>
           </a:p>
           <a:p>
             <a:pPr lvl="1"/>
             <a:r>
-              <a:rPr lang="en-US" smtClean="0"/>
+              <a:rPr lang="en-US"/>
               <a:t>Second level</a:t>
             </a:r>
           </a:p>
           <a:p>
             <a:pPr lvl="2"/>
             <a:r>
-              <a:rPr lang="en-US" smtClean="0"/>
+              <a:rPr lang="en-US"/>
               <a:t>Third level</a:t>
             </a:r>
           </a:p>
           <a:p>
             <a:pPr lvl="3"/>
             <a:r>
-              <a:rPr lang="en-US" smtClean="0"/>
+              <a:rPr lang="en-US"/>
               <a:t>Fourth level</a:t>
             </a:r>
           </a:p>
           <a:p>
             <a:pPr lvl="4"/>
             <a:r>
-              <a:rPr lang="en-US" smtClean="0"/>
+              <a:rPr lang="en-US"/>
               <a:t>Fifth level</a:t>
             </a:r>
-            <a:endParaRPr lang="en-US"/>
           </a:p>
         </p:txBody>
       </p:sp>
@@ -1280,7 +1078,7 @@
           <a:p>
             <a:fld id="{2691D6E4-0F7A-0249-86EF-226720E50E4C}" type="datetimeFigureOut">
               <a:rPr lang="en-US" smtClean="0"/>
-              <a:t>4/3/19</a:t>
+              <a:t>4/1/20</a:t>
             </a:fld>
             <a:endParaRPr lang="en-US"/>
           </a:p>
@@ -1390,10 +1188,9 @@
           <a:lstStyle/>
           <a:p>
             <a:r>
-              <a:rPr lang="en-US" smtClean="0"/>
+              <a:rPr lang="en-US"/>
               <a:t>Click to edit Master title style</a:t>
             </a:r>
-            <a:endParaRPr lang="en-US"/>
           </a:p>
         </p:txBody>
       </p:sp>
@@ -1414,38 +1211,37 @@
           <a:p>
             <a:pPr lvl="0"/>
             <a:r>
-              <a:rPr lang="en-US" smtClean="0"/>
+              <a:rPr lang="en-US"/>
               <a:t>Click to edit Master text styles</a:t>
             </a:r>
           </a:p>
           <a:p>
             <a:pPr lvl="1"/>
             <a:r>
-              <a:rPr lang="en-US" smtClean="0"/>
+              <a:rPr lang="en-US"/>
               <a:t>Second level</a:t>
             </a:r>
           </a:p>
           <a:p>
             <a:pPr lvl="2"/>
             <a:r>
-              <a:rPr lang="en-US" smtClean="0"/>
+              <a:rPr lang="en-US"/>
               <a:t>Third level</a:t>
             </a:r>
           </a:p>
           <a:p>
             <a:pPr lvl="3"/>
             <a:r>
-              <a:rPr lang="en-US" smtClean="0"/>
+              <a:rPr lang="en-US"/>
               <a:t>Fourth level</a:t>
             </a:r>
           </a:p>
           <a:p>
             <a:pPr lvl="4"/>
             <a:r>
-              <a:rPr lang="en-US" smtClean="0"/>
+              <a:rPr lang="en-US"/>
               <a:t>Fifth level</a:t>
             </a:r>
-            <a:endParaRPr lang="en-US"/>
           </a:p>
         </p:txBody>
       </p:sp>
@@ -1474,7 +1270,7 @@
           <a:p>
             <a:fld id="{2691D6E4-0F7A-0249-86EF-226720E50E4C}" type="datetimeFigureOut">
               <a:rPr lang="en-US" smtClean="0"/>
-              <a:t>4/3/19</a:t>
+              <a:t>4/1/20</a:t>
             </a:fld>
             <a:endParaRPr lang="en-US"/>
           </a:p>
@@ -1593,10 +1389,9 @@
           </a:lstStyle>
           <a:p>
             <a:r>
-              <a:rPr lang="en-US" smtClean="0"/>
+              <a:rPr lang="en-US"/>
               <a:t>Click to edit Master title style</a:t>
             </a:r>
-            <a:endParaRPr lang="en-US"/>
           </a:p>
         </p:txBody>
       </p:sp>
@@ -1713,7 +1508,7 @@
           <a:p>
             <a:pPr lvl="0"/>
             <a:r>
-              <a:rPr lang="en-US" smtClean="0"/>
+              <a:rPr lang="en-US"/>
               <a:t>Click to edit Master text styles</a:t>
             </a:r>
           </a:p>
@@ -1744,7 +1539,7 @@
           <a:p>
             <a:fld id="{2691D6E4-0F7A-0249-86EF-226720E50E4C}" type="datetimeFigureOut">
               <a:rPr lang="en-US" smtClean="0"/>
-              <a:t>4/3/19</a:t>
+              <a:t>4/1/20</a:t>
             </a:fld>
             <a:endParaRPr lang="en-US"/>
           </a:p>
@@ -1854,10 +1649,9 @@
           <a:lstStyle/>
           <a:p>
             <a:r>
-              <a:rPr lang="en-US" smtClean="0"/>
+              <a:rPr lang="en-US"/>
               <a:t>Click to edit Master title style</a:t>
             </a:r>
-            <a:endParaRPr lang="en-US"/>
           </a:p>
         </p:txBody>
       </p:sp>
@@ -1911,38 +1705,37 @@
           <a:p>
             <a:pPr lvl="0"/>
             <a:r>
-              <a:rPr lang="en-US" smtClean="0"/>
+              <a:rPr lang="en-US"/>
               <a:t>Click to edit Master text styles</a:t>
             </a:r>
           </a:p>
           <a:p>
             <a:pPr lvl="1"/>
             <a:r>
-              <a:rPr lang="en-US" smtClean="0"/>
+              <a:rPr lang="en-US"/>
               <a:t>Second level</a:t>
             </a:r>
           </a:p>
           <a:p>
             <a:pPr lvl="2"/>
             <a:r>
-              <a:rPr lang="en-US" smtClean="0"/>
+              <a:rPr lang="en-US"/>
               <a:t>Third level</a:t>
             </a:r>
           </a:p>
           <a:p>
             <a:pPr lvl="3"/>
             <a:r>
-              <a:rPr lang="en-US" smtClean="0"/>
+              <a:rPr lang="en-US"/>
               <a:t>Fourth level</a:t>
             </a:r>
           </a:p>
           <a:p>
             <a:pPr lvl="4"/>
             <a:r>
-              <a:rPr lang="en-US" smtClean="0"/>
+              <a:rPr lang="en-US"/>
               <a:t>Fifth level</a:t>
             </a:r>
-            <a:endParaRPr lang="en-US"/>
           </a:p>
         </p:txBody>
       </p:sp>
@@ -1996,38 +1789,37 @@
           <a:p>
             <a:pPr lvl="0"/>
             <a:r>
-              <a:rPr lang="en-US" smtClean="0"/>
+              <a:rPr lang="en-US"/>
               <a:t>Click to edit Master text styles</a:t>
             </a:r>
           </a:p>
           <a:p>
             <a:pPr lvl="1"/>
             <a:r>
-              <a:rPr lang="en-US" smtClean="0"/>
+              <a:rPr lang="en-US"/>
               <a:t>Second level</a:t>
             </a:r>
           </a:p>
           <a:p>
             <a:pPr lvl="2"/>
             <a:r>
-              <a:rPr lang="en-US" smtClean="0"/>
+              <a:rPr lang="en-US"/>
               <a:t>Third level</a:t>
             </a:r>
           </a:p>
           <a:p>
             <a:pPr lvl="3"/>
             <a:r>
-              <a:rPr lang="en-US" smtClean="0"/>
+              <a:rPr lang="en-US"/>
               <a:t>Fourth level</a:t>
             </a:r>
           </a:p>
           <a:p>
             <a:pPr lvl="4"/>
             <a:r>
-              <a:rPr lang="en-US" smtClean="0"/>
+              <a:rPr lang="en-US"/>
               <a:t>Fifth level</a:t>
             </a:r>
-            <a:endParaRPr lang="en-US"/>
           </a:p>
         </p:txBody>
       </p:sp>
@@ -2056,7 +1848,7 @@
           <a:p>
             <a:fld id="{2691D6E4-0F7A-0249-86EF-226720E50E4C}" type="datetimeFigureOut">
               <a:rPr lang="en-US" smtClean="0"/>
-              <a:t>4/3/19</a:t>
+              <a:t>4/1/20</a:t>
             </a:fld>
             <a:endParaRPr lang="en-US"/>
           </a:p>
@@ -2170,10 +1962,9 @@
           </a:lstStyle>
           <a:p>
             <a:r>
-              <a:rPr lang="en-US" smtClean="0"/>
+              <a:rPr lang="en-US"/>
               <a:t>Click to edit Master title style</a:t>
             </a:r>
-            <a:endParaRPr lang="en-US"/>
           </a:p>
         </p:txBody>
       </p:sp>
@@ -2236,7 +2027,7 @@
           <a:p>
             <a:pPr lvl="0"/>
             <a:r>
-              <a:rPr lang="en-US" smtClean="0"/>
+              <a:rPr lang="en-US"/>
               <a:t>Click to edit Master text styles</a:t>
             </a:r>
           </a:p>
@@ -2292,38 +2083,37 @@
           <a:p>
             <a:pPr lvl="0"/>
             <a:r>
-              <a:rPr lang="en-US" smtClean="0"/>
+              <a:rPr lang="en-US"/>
               <a:t>Click to edit Master text styles</a:t>
             </a:r>
           </a:p>
           <a:p>
             <a:pPr lvl="1"/>
             <a:r>
-              <a:rPr lang="en-US" smtClean="0"/>
+              <a:rPr lang="en-US"/>
               <a:t>Second level</a:t>
             </a:r>
           </a:p>
           <a:p>
             <a:pPr lvl="2"/>
             <a:r>
-              <a:rPr lang="en-US" smtClean="0"/>
+              <a:rPr lang="en-US"/>
               <a:t>Third level</a:t>
             </a:r>
           </a:p>
           <a:p>
             <a:pPr lvl="3"/>
             <a:r>
-              <a:rPr lang="en-US" smtClean="0"/>
+              <a:rPr lang="en-US"/>
               <a:t>Fourth level</a:t>
             </a:r>
           </a:p>
           <a:p>
             <a:pPr lvl="4"/>
             <a:r>
-              <a:rPr lang="en-US" smtClean="0"/>
+              <a:rPr lang="en-US"/>
               <a:t>Fifth level</a:t>
             </a:r>
-            <a:endParaRPr lang="en-US"/>
           </a:p>
         </p:txBody>
       </p:sp>
@@ -2386,7 +2176,7 @@
           <a:p>
             <a:pPr lvl="0"/>
             <a:r>
-              <a:rPr lang="en-US" smtClean="0"/>
+              <a:rPr lang="en-US"/>
               <a:t>Click to edit Master text styles</a:t>
             </a:r>
           </a:p>
@@ -2442,38 +2232,37 @@
           <a:p>
             <a:pPr lvl="0"/>
             <a:r>
-              <a:rPr lang="en-US" smtClean="0"/>
+              <a:rPr lang="en-US"/>
               <a:t>Click to edit Master text styles</a:t>
             </a:r>
           </a:p>
           <a:p>
             <a:pPr lvl="1"/>
             <a:r>
-              <a:rPr lang="en-US" smtClean="0"/>
+              <a:rPr lang="en-US"/>
               <a:t>Second level</a:t>
             </a:r>
           </a:p>
           <a:p>
             <a:pPr lvl="2"/>
             <a:r>
-              <a:rPr lang="en-US" smtClean="0"/>
+              <a:rPr lang="en-US"/>
               <a:t>Third level</a:t>
             </a:r>
           </a:p>
           <a:p>
             <a:pPr lvl="3"/>
             <a:r>
-              <a:rPr lang="en-US" smtClean="0"/>
+              <a:rPr lang="en-US"/>
               <a:t>Fourth level</a:t>
             </a:r>
           </a:p>
           <a:p>
             <a:pPr lvl="4"/>
             <a:r>
-              <a:rPr lang="en-US" smtClean="0"/>
+              <a:rPr lang="en-US"/>
               <a:t>Fifth level</a:t>
             </a:r>
-            <a:endParaRPr lang="en-US"/>
           </a:p>
         </p:txBody>
       </p:sp>
@@ -2502,7 +2291,7 @@
           <a:p>
             <a:fld id="{2691D6E4-0F7A-0249-86EF-226720E50E4C}" type="datetimeFigureOut">
               <a:rPr lang="en-US" smtClean="0"/>
-              <a:t>4/3/19</a:t>
+              <a:t>4/1/20</a:t>
             </a:fld>
             <a:endParaRPr lang="en-US"/>
           </a:p>
@@ -2612,10 +2401,9 @@
           <a:lstStyle/>
           <a:p>
             <a:r>
-              <a:rPr lang="en-US" smtClean="0"/>
+              <a:rPr lang="en-US"/>
               <a:t>Click to edit Master title style</a:t>
             </a:r>
-            <a:endParaRPr lang="en-US"/>
           </a:p>
         </p:txBody>
       </p:sp>
@@ -2644,7 +2432,7 @@
           <a:p>
             <a:fld id="{2691D6E4-0F7A-0249-86EF-226720E50E4C}" type="datetimeFigureOut">
               <a:rPr lang="en-US" smtClean="0"/>
-              <a:t>4/3/19</a:t>
+              <a:t>4/1/20</a:t>
             </a:fld>
             <a:endParaRPr lang="en-US"/>
           </a:p>
@@ -2763,7 +2551,7 @@
           <a:p>
             <a:fld id="{2691D6E4-0F7A-0249-86EF-226720E50E4C}" type="datetimeFigureOut">
               <a:rPr lang="en-US" smtClean="0"/>
-              <a:t>4/3/19</a:t>
+              <a:t>4/1/20</a:t>
             </a:fld>
             <a:endParaRPr lang="en-US"/>
           </a:p>
@@ -2882,10 +2670,9 @@
           </a:lstStyle>
           <a:p>
             <a:r>
-              <a:rPr lang="en-US" smtClean="0"/>
+              <a:rPr lang="en-US"/>
               <a:t>Click to edit Master title style</a:t>
             </a:r>
-            <a:endParaRPr lang="en-US"/>
           </a:p>
         </p:txBody>
       </p:sp>
@@ -2939,38 +2726,37 @@
           <a:p>
             <a:pPr lvl="0"/>
             <a:r>
-              <a:rPr lang="en-US" smtClean="0"/>
+              <a:rPr lang="en-US"/>
               <a:t>Click to edit Master text styles</a:t>
             </a:r>
           </a:p>
           <a:p>
             <a:pPr lvl="1"/>
             <a:r>
-              <a:rPr lang="en-US" smtClean="0"/>
+              <a:rPr lang="en-US"/>
               <a:t>Second level</a:t>
             </a:r>
           </a:p>
           <a:p>
             <a:pPr lvl="2"/>
             <a:r>
-              <a:rPr lang="en-US" smtClean="0"/>
+              <a:rPr lang="en-US"/>
               <a:t>Third level</a:t>
             </a:r>
           </a:p>
           <a:p>
             <a:pPr lvl="3"/>
             <a:r>
-              <a:rPr lang="en-US" smtClean="0"/>
+              <a:rPr lang="en-US"/>
               <a:t>Fourth level</a:t>
             </a:r>
           </a:p>
           <a:p>
             <a:pPr lvl="4"/>
             <a:r>
-              <a:rPr lang="en-US" smtClean="0"/>
+              <a:rPr lang="en-US"/>
               <a:t>Fifth level</a:t>
             </a:r>
-            <a:endParaRPr lang="en-US"/>
           </a:p>
         </p:txBody>
       </p:sp>
@@ -3033,7 +2819,7 @@
           <a:p>
             <a:pPr lvl="0"/>
             <a:r>
-              <a:rPr lang="en-US" smtClean="0"/>
+              <a:rPr lang="en-US"/>
               <a:t>Click to edit Master text styles</a:t>
             </a:r>
           </a:p>
@@ -3064,7 +2850,7 @@
           <a:p>
             <a:fld id="{2691D6E4-0F7A-0249-86EF-226720E50E4C}" type="datetimeFigureOut">
               <a:rPr lang="en-US" smtClean="0"/>
-              <a:t>4/3/19</a:t>
+              <a:t>4/1/20</a:t>
             </a:fld>
             <a:endParaRPr lang="en-US"/>
           </a:p>
@@ -3183,10 +2969,9 @@
           </a:lstStyle>
           <a:p>
             <a:r>
-              <a:rPr lang="en-US" smtClean="0"/>
+              <a:rPr lang="en-US"/>
               <a:t>Click to edit Master title style</a:t>
             </a:r>
-            <a:endParaRPr lang="en-US"/>
           </a:p>
         </p:txBody>
       </p:sp>
@@ -3310,7 +3095,7 @@
           <a:p>
             <a:pPr lvl="0"/>
             <a:r>
-              <a:rPr lang="en-US" smtClean="0"/>
+              <a:rPr lang="en-US"/>
               <a:t>Click to edit Master text styles</a:t>
             </a:r>
           </a:p>
@@ -3341,7 +3126,7 @@
           <a:p>
             <a:fld id="{2691D6E4-0F7A-0249-86EF-226720E50E4C}" type="datetimeFigureOut">
               <a:rPr lang="en-US" smtClean="0"/>
-              <a:t>4/3/19</a:t>
+              <a:t>4/1/20</a:t>
             </a:fld>
             <a:endParaRPr lang="en-US"/>
           </a:p>
@@ -3466,10 +3251,9 @@
           <a:lstStyle/>
           <a:p>
             <a:r>
-              <a:rPr lang="en-US" smtClean="0"/>
+              <a:rPr lang="en-US"/>
               <a:t>Click to edit Master title style</a:t>
             </a:r>
-            <a:endParaRPr lang="en-US"/>
           </a:p>
         </p:txBody>
       </p:sp>
@@ -3500,38 +3284,37 @@
           <a:p>
             <a:pPr lvl="0"/>
             <a:r>
-              <a:rPr lang="en-US" smtClean="0"/>
+              <a:rPr lang="en-US"/>
               <a:t>Click to edit Master text styles</a:t>
             </a:r>
           </a:p>
           <a:p>
             <a:pPr lvl="1"/>
             <a:r>
-              <a:rPr lang="en-US" smtClean="0"/>
+              <a:rPr lang="en-US"/>
               <a:t>Second level</a:t>
             </a:r>
           </a:p>
           <a:p>
             <a:pPr lvl="2"/>
             <a:r>
-              <a:rPr lang="en-US" smtClean="0"/>
+              <a:rPr lang="en-US"/>
               <a:t>Third level</a:t>
             </a:r>
           </a:p>
           <a:p>
             <a:pPr lvl="3"/>
             <a:r>
-              <a:rPr lang="en-US" smtClean="0"/>
+              <a:rPr lang="en-US"/>
               <a:t>Fourth level</a:t>
             </a:r>
           </a:p>
           <a:p>
             <a:pPr lvl="4"/>
             <a:r>
-              <a:rPr lang="en-US" smtClean="0"/>
+              <a:rPr lang="en-US"/>
               <a:t>Fifth level</a:t>
             </a:r>
-            <a:endParaRPr lang="en-US"/>
           </a:p>
         </p:txBody>
       </p:sp>
@@ -3940,563 +3723,35 @@
             <a:spLocks noGrp="1"/>
           </p:cNvSpPr>
           <p:nvPr>
-            <p:ph type="ctrTitle"/>
-          </p:nvPr>
-        </p:nvSpPr>
-        <p:spPr>
-          <a:xfrm>
-            <a:off x="594360" y="2082217"/>
-            <a:ext cx="7772400" cy="757495"/>
-          </a:xfrm>
-        </p:spPr>
-        <p:txBody>
-          <a:bodyPr>
-            <a:normAutofit/>
-          </a:bodyPr>
+            <p:ph type="title"/>
+          </p:nvPr>
+        </p:nvSpPr>
+        <p:spPr/>
+        <p:txBody>
+          <a:bodyPr/>
           <a:lstStyle/>
           <a:p>
             <a:r>
-              <a:rPr lang="en-US" sz="3600" dirty="0" smtClean="0"/>
-              <a:t>DIRECT Capstone (</a:t>
-            </a:r>
-            <a:r>
-              <a:rPr lang="en-US" sz="3600" dirty="0" err="1" smtClean="0"/>
-              <a:t>ChemE</a:t>
-            </a:r>
-            <a:r>
-              <a:rPr lang="en-US" sz="3600" dirty="0" smtClean="0"/>
-              <a:t>/MSE 547)</a:t>
-            </a:r>
-            <a:endParaRPr lang="en-US" sz="3600" dirty="0"/>
-          </a:p>
-        </p:txBody>
-      </p:sp>
-      <p:sp>
-        <p:nvSpPr>
-          <p:cNvPr id="3" name="Subtitle 2"/>
-          <p:cNvSpPr>
-            <a:spLocks noGrp="1"/>
-          </p:cNvSpPr>
-          <p:nvPr>
-            <p:ph type="subTitle" idx="1"/>
-          </p:nvPr>
-        </p:nvSpPr>
-        <p:spPr>
-          <a:xfrm>
-            <a:off x="228600" y="5259946"/>
-            <a:ext cx="8705850" cy="1150453"/>
-          </a:xfrm>
-        </p:spPr>
+              <a:rPr lang="en-US" dirty="0"/>
+              <a:t>Welcome!</a:t>
+            </a:r>
+          </a:p>
+        </p:txBody>
+      </p:sp>
+      <p:sp>
+        <p:nvSpPr>
+          <p:cNvPr id="3" name="Content Placeholder 2"/>
+          <p:cNvSpPr>
+            <a:spLocks noGrp="1"/>
+          </p:cNvSpPr>
+          <p:nvPr>
+            <p:ph idx="1"/>
+          </p:nvPr>
+        </p:nvSpPr>
+        <p:spPr/>
         <p:txBody>
           <a:bodyPr>
             <a:normAutofit lnSpcReduction="10000"/>
-          </a:bodyPr>
-          <a:lstStyle/>
-          <a:p>
-            <a:r>
-              <a:rPr lang="en-US" dirty="0" smtClean="0"/>
-              <a:t>David A. C. Beck (dacb)</a:t>
-            </a:r>
-          </a:p>
-          <a:p>
-            <a:r>
-              <a:rPr lang="en-US" dirty="0" smtClean="0"/>
-              <a:t>Chemical Engineering &amp; </a:t>
-            </a:r>
-            <a:r>
-              <a:rPr lang="en-US" dirty="0" err="1" smtClean="0"/>
-              <a:t>eScience</a:t>
-            </a:r>
-            <a:r>
-              <a:rPr lang="en-US" dirty="0" smtClean="0"/>
-              <a:t> Institute</a:t>
-            </a:r>
-            <a:endParaRPr lang="en-US" dirty="0"/>
-          </a:p>
-        </p:txBody>
-      </p:sp>
-      <p:sp>
-        <p:nvSpPr>
-          <p:cNvPr id="6" name="Rectangle 5"/>
-          <p:cNvSpPr/>
-          <p:nvPr/>
-        </p:nvSpPr>
-        <p:spPr>
-          <a:xfrm>
-            <a:off x="0" y="192900"/>
-            <a:ext cx="9144000" cy="1430676"/>
-          </a:xfrm>
-          <a:prstGeom prst="rect">
-            <a:avLst/>
-          </a:prstGeom>
-          <a:solidFill>
-            <a:schemeClr val="bg1"/>
-          </a:solidFill>
-          <a:ln>
-            <a:solidFill>
-              <a:schemeClr val="bg1"/>
-            </a:solidFill>
-          </a:ln>
-          <a:effectLst/>
-        </p:spPr>
-        <p:style>
-          <a:lnRef idx="1">
-            <a:schemeClr val="accent1"/>
-          </a:lnRef>
-          <a:fillRef idx="3">
-            <a:schemeClr val="accent1"/>
-          </a:fillRef>
-          <a:effectRef idx="2">
-            <a:schemeClr val="accent1"/>
-          </a:effectRef>
-          <a:fontRef idx="minor">
-            <a:schemeClr val="lt1"/>
-          </a:fontRef>
-        </p:style>
-        <p:txBody>
-          <a:bodyPr rtlCol="0" anchor="ctr"/>
-          <a:lstStyle/>
-          <a:p>
-            <a:pPr algn="ctr"/>
-            <a:endParaRPr lang="en-US" dirty="0"/>
-          </a:p>
-        </p:txBody>
-      </p:sp>
-      <p:sp>
-        <p:nvSpPr>
-          <p:cNvPr id="7" name="TextBox 6"/>
-          <p:cNvSpPr txBox="1"/>
-          <p:nvPr/>
-        </p:nvSpPr>
-        <p:spPr>
-          <a:xfrm>
-            <a:off x="5759670" y="1261298"/>
-            <a:ext cx="2837792" cy="646331"/>
-          </a:xfrm>
-          <a:prstGeom prst="rect">
-            <a:avLst/>
-          </a:prstGeom>
-          <a:noFill/>
-        </p:spPr>
-        <p:txBody>
-          <a:bodyPr wrap="square" rtlCol="0">
-            <a:spAutoFit/>
-          </a:bodyPr>
-          <a:lstStyle/>
-          <a:p>
-            <a:pPr algn="ctr"/>
-            <a:r>
-              <a:rPr lang="en-US" smtClean="0"/>
-              <a:t>Advancing data-intensive </a:t>
-            </a:r>
-            <a:r>
-              <a:rPr lang="en-US" dirty="0" smtClean="0"/>
-              <a:t>discovery in all fields</a:t>
-            </a:r>
-            <a:endParaRPr lang="en-US" dirty="0"/>
-          </a:p>
-        </p:txBody>
-      </p:sp>
-      <p:sp>
-        <p:nvSpPr>
-          <p:cNvPr id="8" name="TextBox 7"/>
-          <p:cNvSpPr txBox="1"/>
-          <p:nvPr/>
-        </p:nvSpPr>
-        <p:spPr>
-          <a:xfrm>
-            <a:off x="594360" y="1271446"/>
-            <a:ext cx="2636688" cy="646331"/>
-          </a:xfrm>
-          <a:prstGeom prst="rect">
-            <a:avLst/>
-          </a:prstGeom>
-          <a:noFill/>
-        </p:spPr>
-        <p:txBody>
-          <a:bodyPr wrap="square" rtlCol="0">
-            <a:spAutoFit/>
-          </a:bodyPr>
-          <a:lstStyle/>
-          <a:p>
-            <a:pPr algn="ctr"/>
-            <a:r>
-              <a:rPr lang="en-US" dirty="0"/>
-              <a:t>Knowledge and solutions for a changing world</a:t>
-            </a:r>
-          </a:p>
-        </p:txBody>
-      </p:sp>
-      <p:pic>
-        <p:nvPicPr>
-          <p:cNvPr id="4" name="Picture 3"/>
-          <p:cNvPicPr>
-            <a:picLocks noChangeAspect="1"/>
-          </p:cNvPicPr>
-          <p:nvPr/>
-        </p:nvPicPr>
-        <p:blipFill>
-          <a:blip r:embed="rId3"/>
-          <a:stretch>
-            <a:fillRect/>
-          </a:stretch>
-        </p:blipFill>
-        <p:spPr>
-          <a:xfrm>
-            <a:off x="1387178" y="339363"/>
-            <a:ext cx="965200" cy="952500"/>
-          </a:xfrm>
-          <a:prstGeom prst="rect">
-            <a:avLst/>
-          </a:prstGeom>
-        </p:spPr>
-      </p:pic>
-      <p:pic>
-        <p:nvPicPr>
-          <p:cNvPr id="5" name="Picture 4"/>
-          <p:cNvPicPr>
-            <a:picLocks noChangeAspect="1"/>
-          </p:cNvPicPr>
-          <p:nvPr/>
-        </p:nvPicPr>
-        <p:blipFill>
-          <a:blip r:embed="rId4"/>
-          <a:stretch>
-            <a:fillRect/>
-          </a:stretch>
-        </p:blipFill>
-        <p:spPr>
-          <a:xfrm>
-            <a:off x="6679139" y="355598"/>
-            <a:ext cx="876300" cy="967282"/>
-          </a:xfrm>
-          <a:prstGeom prst="rect">
-            <a:avLst/>
-          </a:prstGeom>
-        </p:spPr>
-      </p:pic>
-      <p:pic>
-        <p:nvPicPr>
-          <p:cNvPr id="9" name="Picture 8"/>
-          <p:cNvPicPr>
-            <a:picLocks noChangeAspect="1"/>
-          </p:cNvPicPr>
-          <p:nvPr/>
-        </p:nvPicPr>
-        <p:blipFill>
-          <a:blip r:embed="rId5"/>
-          <a:stretch>
-            <a:fillRect/>
-          </a:stretch>
-        </p:blipFill>
-        <p:spPr>
-          <a:xfrm>
-            <a:off x="3822232" y="204582"/>
-            <a:ext cx="1418994" cy="1418994"/>
-          </a:xfrm>
-          <a:prstGeom prst="rect">
-            <a:avLst/>
-          </a:prstGeom>
-        </p:spPr>
-      </p:pic>
-      <p:sp>
-        <p:nvSpPr>
-          <p:cNvPr id="10" name="TextBox 9"/>
-          <p:cNvSpPr txBox="1"/>
-          <p:nvPr/>
-        </p:nvSpPr>
-        <p:spPr>
-          <a:xfrm>
-            <a:off x="3390984" y="1623576"/>
-            <a:ext cx="2218676" cy="369332"/>
-          </a:xfrm>
-          <a:prstGeom prst="rect">
-            <a:avLst/>
-          </a:prstGeom>
-          <a:noFill/>
-        </p:spPr>
-        <p:txBody>
-          <a:bodyPr wrap="square" rtlCol="0">
-            <a:spAutoFit/>
-          </a:bodyPr>
-          <a:lstStyle/>
-          <a:p>
-            <a:pPr algn="ctr"/>
-            <a:r>
-              <a:rPr lang="en-US" dirty="0" smtClean="0"/>
-              <a:t>Be boundless</a:t>
-            </a:r>
-            <a:endParaRPr lang="en-US" dirty="0"/>
-          </a:p>
-        </p:txBody>
-      </p:sp>
-      <p:sp>
-        <p:nvSpPr>
-          <p:cNvPr id="11" name="Rectangle 10"/>
-          <p:cNvSpPr/>
-          <p:nvPr/>
-        </p:nvSpPr>
-        <p:spPr>
-          <a:xfrm>
-            <a:off x="228600" y="4862644"/>
-            <a:ext cx="8705850" cy="107950"/>
-          </a:xfrm>
-          <a:prstGeom prst="rect">
-            <a:avLst/>
-          </a:prstGeom>
-          <a:gradFill flip="none" rotWithShape="1">
-            <a:gsLst>
-              <a:gs pos="0">
-                <a:srgbClr val="599BD1"/>
-              </a:gs>
-              <a:gs pos="100000">
-                <a:srgbClr val="9BBB59"/>
-              </a:gs>
-              <a:gs pos="50000">
-                <a:srgbClr val="E58B43"/>
-              </a:gs>
-              <a:gs pos="60000">
-                <a:srgbClr val="FFC824"/>
-              </a:gs>
-            </a:gsLst>
-            <a:lin ang="0" scaled="1"/>
-            <a:tileRect/>
-          </a:gradFill>
-          <a:ln>
-            <a:noFill/>
-          </a:ln>
-          <a:effectLst/>
-        </p:spPr>
-        <p:style>
-          <a:lnRef idx="1">
-            <a:schemeClr val="accent1"/>
-          </a:lnRef>
-          <a:fillRef idx="3">
-            <a:schemeClr val="accent1"/>
-          </a:fillRef>
-          <a:effectRef idx="2">
-            <a:schemeClr val="accent1"/>
-          </a:effectRef>
-          <a:fontRef idx="minor">
-            <a:schemeClr val="lt1"/>
-          </a:fontRef>
-        </p:style>
-        <p:txBody>
-          <a:bodyPr rtlCol="0" anchor="ctr"/>
-          <a:lstStyle/>
-          <a:p>
-            <a:endParaRPr lang="en-US"/>
-          </a:p>
-        </p:txBody>
-      </p:sp>
-      <p:sp>
-        <p:nvSpPr>
-          <p:cNvPr id="13" name="Rectangle 12"/>
-          <p:cNvSpPr/>
-          <p:nvPr/>
-        </p:nvSpPr>
-        <p:spPr>
-          <a:xfrm>
-            <a:off x="228600" y="2976193"/>
-            <a:ext cx="8705850" cy="107950"/>
-          </a:xfrm>
-          <a:prstGeom prst="rect">
-            <a:avLst/>
-          </a:prstGeom>
-          <a:gradFill flip="none" rotWithShape="1">
-            <a:gsLst>
-              <a:gs pos="0">
-                <a:srgbClr val="599BD1"/>
-              </a:gs>
-              <a:gs pos="100000">
-                <a:srgbClr val="9BBB59"/>
-              </a:gs>
-              <a:gs pos="50000">
-                <a:srgbClr val="E58B43"/>
-              </a:gs>
-              <a:gs pos="60000">
-                <a:srgbClr val="FFC824"/>
-              </a:gs>
-            </a:gsLst>
-            <a:lin ang="0" scaled="1"/>
-            <a:tileRect/>
-          </a:gradFill>
-          <a:ln>
-            <a:noFill/>
-          </a:ln>
-          <a:effectLst/>
-        </p:spPr>
-        <p:style>
-          <a:lnRef idx="1">
-            <a:schemeClr val="accent1"/>
-          </a:lnRef>
-          <a:fillRef idx="3">
-            <a:schemeClr val="accent1"/>
-          </a:fillRef>
-          <a:effectRef idx="2">
-            <a:schemeClr val="accent1"/>
-          </a:effectRef>
-          <a:fontRef idx="minor">
-            <a:schemeClr val="lt1"/>
-          </a:fontRef>
-        </p:style>
-        <p:txBody>
-          <a:bodyPr rtlCol="0" anchor="ctr"/>
-          <a:lstStyle/>
-          <a:p>
-            <a:endParaRPr lang="en-US"/>
-          </a:p>
-        </p:txBody>
-      </p:sp>
-      <p:sp>
-        <p:nvSpPr>
-          <p:cNvPr id="14" name="Title 1"/>
-          <p:cNvSpPr txBox="1">
-            <a:spLocks/>
-          </p:cNvSpPr>
-          <p:nvPr/>
-        </p:nvSpPr>
-        <p:spPr>
-          <a:xfrm>
-            <a:off x="228600" y="2812059"/>
-            <a:ext cx="8705850" cy="2173300"/>
-          </a:xfrm>
-          <a:prstGeom prst="rect">
-            <a:avLst/>
-          </a:prstGeom>
-        </p:spPr>
-        <p:txBody>
-          <a:bodyPr vert="horz" lIns="91440" tIns="45720" rIns="91440" bIns="45720" rtlCol="0" anchor="ctr">
-            <a:normAutofit/>
-          </a:bodyPr>
-          <a:lstStyle>
-            <a:lvl1pPr algn="ctr" defTabSz="457200" rtl="0" eaLnBrk="1" latinLnBrk="0" hangingPunct="1">
-              <a:spcBef>
-                <a:spcPct val="0"/>
-              </a:spcBef>
-              <a:buNone/>
-              <a:defRPr sz="4400" kern="1200">
-                <a:solidFill>
-                  <a:schemeClr val="tx1"/>
-                </a:solidFill>
-                <a:latin typeface="+mj-lt"/>
-                <a:ea typeface="+mj-ea"/>
-                <a:cs typeface="+mj-cs"/>
-              </a:defRPr>
-            </a:lvl1pPr>
-          </a:lstStyle>
-          <a:p>
-            <a:r>
-              <a:rPr lang="en-US" sz="3600" dirty="0" smtClean="0"/>
-              <a:t>UW DIRECT</a:t>
-            </a:r>
-          </a:p>
-          <a:p>
-            <a:r>
-              <a:rPr lang="en-US" sz="3600" dirty="0" smtClean="0"/>
-              <a:t>(</a:t>
-            </a:r>
-            <a:r>
-              <a:rPr lang="en-US" altLang="zh-CN" sz="2800" dirty="0" smtClean="0"/>
-              <a:t>Data Intensive Research Enabling Cutting-edge Tech</a:t>
-            </a:r>
-            <a:r>
-              <a:rPr lang="en-US" sz="3600" dirty="0" smtClean="0"/>
-              <a:t>) </a:t>
-            </a:r>
-            <a:endParaRPr lang="en-US" sz="3600" dirty="0" smtClean="0"/>
-          </a:p>
-          <a:p>
-            <a:r>
-              <a:rPr lang="en-US" sz="3600" dirty="0">
-                <a:hlinkClick r:id="rId6"/>
-              </a:rPr>
-              <a:t>https://</a:t>
-            </a:r>
-            <a:r>
-              <a:rPr lang="en-US" sz="3600" dirty="0" smtClean="0">
-                <a:hlinkClick r:id="rId6"/>
-              </a:rPr>
-              <a:t>uwdirect.github.io</a:t>
-            </a:r>
-            <a:endParaRPr lang="en-US" sz="3600" dirty="0" smtClean="0"/>
-          </a:p>
-        </p:txBody>
-      </p:sp>
-    </p:spTree>
-    <p:extLst>
-      <p:ext uri="{BB962C8B-B14F-4D97-AF65-F5344CB8AC3E}">
-        <p14:creationId xmlns:p14="http://schemas.microsoft.com/office/powerpoint/2010/main" val="186050905"/>
-      </p:ext>
-    </p:extLst>
-  </p:cSld>
-  <p:clrMapOvr>
-    <a:masterClrMapping/>
-  </p:clrMapOvr>
-  <p:timing>
-    <p:tnLst>
-      <p:par>
-        <p:cTn id="1" dur="indefinite" restart="never" nodeType="tmRoot"/>
-      </p:par>
-    </p:tnLst>
-  </p:timing>
-</p:sld>
-</file>
-
-<file path=ppt/slides/slide10.xml><?xml version="1.0" encoding="utf-8"?>
-<p:sld xmlns:a="http://schemas.openxmlformats.org/drawingml/2006/main" xmlns:r="http://schemas.openxmlformats.org/officeDocument/2006/relationships" xmlns:p="http://schemas.openxmlformats.org/presentationml/2006/main">
-  <p:cSld>
-    <p:spTree>
-      <p:nvGrpSpPr>
-        <p:cNvPr id="1" name=""/>
-        <p:cNvGrpSpPr/>
-        <p:nvPr/>
-      </p:nvGrpSpPr>
-      <p:grpSpPr>
-        <a:xfrm>
-          <a:off x="0" y="0"/>
-          <a:ext cx="0" cy="0"/>
-          <a:chOff x="0" y="0"/>
-          <a:chExt cx="0" cy="0"/>
-        </a:xfrm>
-      </p:grpSpPr>
-      <p:sp>
-        <p:nvSpPr>
-          <p:cNvPr id="2" name="Title 1"/>
-          <p:cNvSpPr>
-            <a:spLocks noGrp="1"/>
-          </p:cNvSpPr>
-          <p:nvPr>
-            <p:ph type="title"/>
-          </p:nvPr>
-        </p:nvSpPr>
-        <p:spPr/>
-        <p:txBody>
-          <a:bodyPr/>
-          <a:lstStyle/>
-          <a:p>
-            <a:r>
-              <a:rPr lang="en-US" dirty="0" smtClean="0"/>
-              <a:t>For the future</a:t>
-            </a:r>
-            <a:endParaRPr lang="en-US" dirty="0"/>
-          </a:p>
-        </p:txBody>
-      </p:sp>
-      <p:sp>
-        <p:nvSpPr>
-          <p:cNvPr id="3" name="Content Placeholder 2"/>
-          <p:cNvSpPr>
-            <a:spLocks noGrp="1"/>
-          </p:cNvSpPr>
-          <p:nvPr>
-            <p:ph idx="1"/>
-          </p:nvPr>
-        </p:nvSpPr>
-        <p:spPr/>
-        <p:txBody>
-          <a:bodyPr>
-            <a:normAutofit/>
           </a:bodyPr>
           <a:lstStyle/>
           <a:p>
@@ -4509,10 +3764,10 @@
               <a:defRPr/>
             </a:pPr>
             <a:r>
-              <a:rPr lang="en-US" dirty="0" smtClean="0">
+              <a:rPr lang="en-US" dirty="0">
                 <a:latin typeface="Calibri" charset="0"/>
               </a:rPr>
-              <a:t>Plan on doing some technology reviews</a:t>
+              <a:t>Zoom logistics and etiquette </a:t>
             </a:r>
           </a:p>
           <a:p>
@@ -4524,7 +3779,35 @@
               <a:buChar char="•"/>
               <a:defRPr/>
             </a:pPr>
-            <a:endParaRPr lang="en-US" dirty="0" smtClean="0">
+            <a:r>
+              <a:rPr lang="en-US" dirty="0">
+                <a:latin typeface="Calibri" charset="0"/>
+              </a:rPr>
+              <a:t>Introductions</a:t>
+            </a:r>
+          </a:p>
+          <a:p>
+            <a:pPr lvl="1">
+              <a:spcBef>
+                <a:spcPts val="800"/>
+              </a:spcBef>
+              <a:buFont typeface="Arial" charset="0"/>
+              <a:buChar char="•"/>
+              <a:defRPr/>
+            </a:pPr>
+            <a:r>
+              <a:rPr lang="en-US" dirty="0">
+                <a:latin typeface="Calibri" charset="0"/>
+              </a:rPr>
+              <a:t>Professor Dan Schwartz, </a:t>
+            </a:r>
+            <a:r>
+              <a:rPr lang="en-US" dirty="0" err="1">
+                <a:latin typeface="Calibri" charset="0"/>
+              </a:rPr>
+              <a:t>ChemE</a:t>
+            </a:r>
+            <a:endParaRPr lang="en-US" dirty="0">
               <a:latin typeface="Calibri" charset="0"/>
             </a:endParaRPr>
           </a:p>
@@ -4538,10 +3821,10 @@
               <a:defRPr/>
             </a:pPr>
             <a:r>
-              <a:rPr lang="en-US" dirty="0" smtClean="0">
+              <a:rPr lang="en-US" dirty="0">
                 <a:latin typeface="Calibri" charset="0"/>
               </a:rPr>
-              <a:t>Identify your project coordination technology</a:t>
+              <a:t>Quarter overview</a:t>
             </a:r>
           </a:p>
           <a:p>
@@ -4554,14 +3837,14 @@
               <a:defRPr/>
             </a:pPr>
             <a:r>
-              <a:rPr lang="en-US" dirty="0" smtClean="0">
+              <a:rPr lang="en-US" dirty="0">
                 <a:latin typeface="Calibri" charset="0"/>
               </a:rPr>
-              <a:t>E.g. from last Q from the room?</a:t>
-            </a:r>
-          </a:p>
-          <a:p>
-            <a:pPr>
+              <a:t>Weeks 1 &amp; 2: successful teaming, stakeholder engagement, project planning</a:t>
+            </a:r>
+          </a:p>
+          <a:p>
+            <a:pPr lvl="1">
               <a:spcBef>
                 <a:spcPts val="800"/>
               </a:spcBef>
@@ -4569,12 +3852,15 @@
               <a:buChar char="•"/>
               <a:defRPr/>
             </a:pPr>
-            <a:endParaRPr lang="en-US" dirty="0" smtClean="0">
-              <a:latin typeface="Calibri" charset="0"/>
-            </a:endParaRPr>
-          </a:p>
-          <a:p>
-            <a:pPr>
+            <a:r>
+              <a:rPr lang="en-US" dirty="0">
+                <a:latin typeface="Calibri" charset="0"/>
+              </a:rPr>
+              <a:t>Weeks 5 &amp; 6: perfect pitch</a:t>
+            </a:r>
+          </a:p>
+          <a:p>
+            <a:pPr lvl="1">
               <a:spcBef>
                 <a:spcPts val="800"/>
               </a:spcBef>
@@ -4583,14 +3869,14 @@
               <a:defRPr/>
             </a:pPr>
             <a:r>
-              <a:rPr lang="en-US" dirty="0" smtClean="0">
+              <a:rPr lang="en-US" dirty="0">
                 <a:latin typeface="Calibri" charset="0"/>
               </a:rPr>
-              <a:t>How often will you meet?</a:t>
-            </a:r>
-          </a:p>
-          <a:p>
-            <a:pPr>
+              <a:t>Weeks 10-14: independent project work</a:t>
+            </a:r>
+          </a:p>
+          <a:p>
+            <a:pPr lvl="1">
               <a:spcBef>
                 <a:spcPts val="800"/>
               </a:spcBef>
@@ -4598,12 +3884,15 @@
               <a:buChar char="•"/>
               <a:defRPr/>
             </a:pPr>
-            <a:endParaRPr lang="en-US" dirty="0">
-              <a:latin typeface="Calibri" charset="0"/>
-            </a:endParaRPr>
-          </a:p>
-          <a:p>
-            <a:pPr>
+            <a:r>
+              <a:rPr lang="en-US" dirty="0">
+                <a:latin typeface="Calibri" charset="0"/>
+              </a:rPr>
+              <a:t>Week 9: how to do an informational interview</a:t>
+            </a:r>
+          </a:p>
+          <a:p>
+            <a:pPr lvl="1">
               <a:spcBef>
                 <a:spcPts val="800"/>
               </a:spcBef>
@@ -4611,149 +3900,25 @@
               <a:buChar char="•"/>
               <a:defRPr/>
             </a:pPr>
-            <a:endParaRPr lang="en-US" dirty="0" smtClean="0">
-              <a:latin typeface="Calibri" charset="0"/>
-            </a:endParaRPr>
+            <a:r>
+              <a:rPr lang="en-US" dirty="0">
+                <a:latin typeface="Calibri" charset="0"/>
+              </a:rPr>
+              <a:t>Other weeks: standups</a:t>
+            </a:r>
           </a:p>
         </p:txBody>
       </p:sp>
     </p:spTree>
     <p:extLst>
       <p:ext uri="{BB962C8B-B14F-4D97-AF65-F5344CB8AC3E}">
-        <p14:creationId xmlns:p14="http://schemas.microsoft.com/office/powerpoint/2010/main" val="1805174496"/>
+        <p14:creationId xmlns:p14="http://schemas.microsoft.com/office/powerpoint/2010/main" val="994220001"/>
       </p:ext>
     </p:extLst>
   </p:cSld>
   <p:clrMapOvr>
     <a:masterClrMapping/>
   </p:clrMapOvr>
-  <p:timing>
-    <p:tnLst>
-      <p:par>
-        <p:cTn id="1" dur="indefinite" restart="never" nodeType="tmRoot"/>
-      </p:par>
-    </p:tnLst>
-  </p:timing>
-</p:sld>
-</file>
-
-<file path=ppt/slides/slide11.xml><?xml version="1.0" encoding="utf-8"?>
-<p:sld xmlns:a="http://schemas.openxmlformats.org/drawingml/2006/main" xmlns:r="http://schemas.openxmlformats.org/officeDocument/2006/relationships" xmlns:p="http://schemas.openxmlformats.org/presentationml/2006/main">
-  <p:cSld>
-    <p:spTree>
-      <p:nvGrpSpPr>
-        <p:cNvPr id="1" name=""/>
-        <p:cNvGrpSpPr/>
-        <p:nvPr/>
-      </p:nvGrpSpPr>
-      <p:grpSpPr>
-        <a:xfrm>
-          <a:off x="0" y="0"/>
-          <a:ext cx="0" cy="0"/>
-          <a:chOff x="0" y="0"/>
-          <a:chExt cx="0" cy="0"/>
-        </a:xfrm>
-      </p:grpSpPr>
-      <p:sp>
-        <p:nvSpPr>
-          <p:cNvPr id="2" name="Title 1"/>
-          <p:cNvSpPr>
-            <a:spLocks noGrp="1"/>
-          </p:cNvSpPr>
-          <p:nvPr>
-            <p:ph type="title"/>
-          </p:nvPr>
-        </p:nvSpPr>
-        <p:spPr/>
-        <p:txBody>
-          <a:bodyPr/>
-          <a:lstStyle/>
-          <a:p>
-            <a:r>
-              <a:rPr lang="en-US" dirty="0"/>
-              <a:t>For the future</a:t>
-            </a:r>
-            <a:endParaRPr lang="en-US" dirty="0"/>
-          </a:p>
-        </p:txBody>
-      </p:sp>
-      <p:sp>
-        <p:nvSpPr>
-          <p:cNvPr id="3" name="Content Placeholder 2"/>
-          <p:cNvSpPr>
-            <a:spLocks noGrp="1"/>
-          </p:cNvSpPr>
-          <p:nvPr>
-            <p:ph idx="1"/>
-          </p:nvPr>
-        </p:nvSpPr>
-        <p:spPr/>
-        <p:txBody>
-          <a:bodyPr>
-            <a:normAutofit/>
-          </a:bodyPr>
-          <a:lstStyle/>
-          <a:p>
-            <a:pPr>
-              <a:spcBef>
-                <a:spcPts val="800"/>
-              </a:spcBef>
-              <a:buFont typeface="Arial" charset="0"/>
-              <a:buChar char="•"/>
-              <a:defRPr/>
-            </a:pPr>
-            <a:r>
-              <a:rPr lang="en-US" dirty="0" smtClean="0">
-                <a:latin typeface="Calibri" charset="0"/>
-              </a:rPr>
-              <a:t>Team name &amp; logo (nail down the important stuff)</a:t>
-            </a:r>
-          </a:p>
-          <a:p>
-            <a:pPr>
-              <a:spcBef>
-                <a:spcPts val="800"/>
-              </a:spcBef>
-              <a:buFont typeface="Arial" charset="0"/>
-              <a:buChar char="•"/>
-              <a:defRPr/>
-            </a:pPr>
-            <a:endParaRPr lang="en-US" dirty="0">
-              <a:latin typeface="Calibri" charset="0"/>
-            </a:endParaRPr>
-          </a:p>
-          <a:p>
-            <a:pPr>
-              <a:spcBef>
-                <a:spcPts val="800"/>
-              </a:spcBef>
-              <a:buFont typeface="Arial" charset="0"/>
-              <a:buChar char="•"/>
-              <a:defRPr/>
-            </a:pPr>
-            <a:endParaRPr lang="en-US" dirty="0" smtClean="0">
-              <a:latin typeface="Calibri" charset="0"/>
-            </a:endParaRPr>
-          </a:p>
-        </p:txBody>
-      </p:sp>
-    </p:spTree>
-    <p:extLst>
-      <p:ext uri="{BB962C8B-B14F-4D97-AF65-F5344CB8AC3E}">
-        <p14:creationId xmlns:p14="http://schemas.microsoft.com/office/powerpoint/2010/main" val="881442052"/>
-      </p:ext>
-    </p:extLst>
-  </p:cSld>
-  <p:clrMapOvr>
-    <a:masterClrMapping/>
-  </p:clrMapOvr>
-  <p:timing>
-    <p:tnLst>
-      <p:par>
-        <p:cTn id="1" dur="indefinite" restart="never" nodeType="tmRoot"/>
-      </p:par>
-    </p:tnLst>
-  </p:timing>
 </p:sld>
 </file>
 
@@ -4790,200 +3955,9 @@
           <a:lstStyle/>
           <a:p>
             <a:r>
-              <a:rPr lang="en-US" dirty="0" smtClean="0"/>
-              <a:t>Welcome, get started</a:t>
-            </a:r>
-            <a:endParaRPr lang="en-US" dirty="0"/>
-          </a:p>
-        </p:txBody>
-      </p:sp>
-      <p:sp>
-        <p:nvSpPr>
-          <p:cNvPr id="3" name="Content Placeholder 2"/>
-          <p:cNvSpPr>
-            <a:spLocks noGrp="1"/>
-          </p:cNvSpPr>
-          <p:nvPr>
-            <p:ph idx="1"/>
-          </p:nvPr>
-        </p:nvSpPr>
-        <p:spPr/>
-        <p:txBody>
-          <a:bodyPr>
-            <a:normAutofit/>
-          </a:bodyPr>
-          <a:lstStyle/>
-          <a:p>
-            <a:pPr>
-              <a:spcBef>
-                <a:spcPts val="800"/>
-              </a:spcBef>
-              <a:buFont typeface="Arial" charset="0"/>
-              <a:buChar char="•"/>
-              <a:defRPr/>
-            </a:pPr>
-            <a:r>
-              <a:rPr lang="en-US" dirty="0" smtClean="0">
-                <a:latin typeface="Calibri" charset="0"/>
-              </a:rPr>
-              <a:t>Find your project teammates</a:t>
-            </a:r>
-          </a:p>
-          <a:p>
-            <a:pPr>
-              <a:spcBef>
-                <a:spcPts val="800"/>
-              </a:spcBef>
-              <a:buFont typeface="Arial" charset="0"/>
-              <a:buChar char="•"/>
-              <a:defRPr/>
-            </a:pPr>
-            <a:endParaRPr lang="en-US" dirty="0" smtClean="0">
-              <a:latin typeface="Calibri" charset="0"/>
-            </a:endParaRPr>
-          </a:p>
-          <a:p>
-            <a:pPr>
-              <a:spcBef>
-                <a:spcPts val="800"/>
-              </a:spcBef>
-              <a:buFont typeface="Arial" charset="0"/>
-              <a:buChar char="•"/>
-              <a:defRPr/>
-            </a:pPr>
-            <a:r>
-              <a:rPr lang="en-US" dirty="0" smtClean="0">
-                <a:latin typeface="Calibri" charset="0"/>
-              </a:rPr>
-              <a:t>Introduce yourself</a:t>
-            </a:r>
-          </a:p>
-          <a:p>
-            <a:pPr lvl="1">
-              <a:spcBef>
-                <a:spcPts val="800"/>
-              </a:spcBef>
-              <a:buFont typeface="Arial" charset="0"/>
-              <a:buChar char="•"/>
-              <a:defRPr/>
-            </a:pPr>
-            <a:r>
-              <a:rPr lang="en-US" dirty="0" smtClean="0">
-                <a:latin typeface="Calibri" charset="0"/>
-              </a:rPr>
-              <a:t>What DIRECT project you worked on last quarter</a:t>
-            </a:r>
-          </a:p>
-          <a:p>
-            <a:pPr lvl="1">
-              <a:spcBef>
-                <a:spcPts val="800"/>
-              </a:spcBef>
-              <a:buFont typeface="Arial" charset="0"/>
-              <a:buChar char="•"/>
-              <a:defRPr/>
-            </a:pPr>
-            <a:r>
-              <a:rPr lang="en-US" dirty="0" smtClean="0">
-                <a:latin typeface="Calibri" charset="0"/>
-              </a:rPr>
-              <a:t>What program you are in</a:t>
-            </a:r>
-          </a:p>
-          <a:p>
-            <a:pPr lvl="1">
-              <a:spcBef>
-                <a:spcPts val="800"/>
-              </a:spcBef>
-              <a:buFont typeface="Arial" charset="0"/>
-              <a:buChar char="•"/>
-              <a:defRPr/>
-            </a:pPr>
-            <a:r>
-              <a:rPr lang="en-US" dirty="0" smtClean="0">
-                <a:latin typeface="Calibri" charset="0"/>
-              </a:rPr>
-              <a:t>Your favorite color</a:t>
-            </a:r>
-          </a:p>
-          <a:p>
-            <a:pPr lvl="1">
-              <a:spcBef>
-                <a:spcPts val="800"/>
-              </a:spcBef>
-              <a:buFont typeface="Arial" charset="0"/>
-              <a:buChar char="•"/>
-              <a:defRPr/>
-            </a:pPr>
-            <a:r>
-              <a:rPr lang="en-US" dirty="0" smtClean="0">
-                <a:latin typeface="Calibri" charset="0"/>
-              </a:rPr>
-              <a:t>Your views on is a hot dog a sandwich?</a:t>
-            </a:r>
-            <a:endParaRPr lang="en-US" dirty="0" smtClean="0">
-              <a:latin typeface="Calibri" charset="0"/>
-            </a:endParaRPr>
-          </a:p>
-        </p:txBody>
-      </p:sp>
-    </p:spTree>
-    <p:extLst>
-      <p:ext uri="{BB962C8B-B14F-4D97-AF65-F5344CB8AC3E}">
-        <p14:creationId xmlns:p14="http://schemas.microsoft.com/office/powerpoint/2010/main" val="994220001"/>
-      </p:ext>
-    </p:extLst>
-  </p:cSld>
-  <p:clrMapOvr>
-    <a:masterClrMapping/>
-  </p:clrMapOvr>
-  <p:timing>
-    <p:tnLst>
-      <p:par>
-        <p:cTn id="1" dur="indefinite" restart="never" nodeType="tmRoot"/>
-      </p:par>
-    </p:tnLst>
-  </p:timing>
-</p:sld>
-</file>
-
-<file path=ppt/slides/slide3.xml><?xml version="1.0" encoding="utf-8"?>
-<p:sld xmlns:a="http://schemas.openxmlformats.org/drawingml/2006/main" xmlns:r="http://schemas.openxmlformats.org/officeDocument/2006/relationships" xmlns:p="http://schemas.openxmlformats.org/presentationml/2006/main">
-  <p:cSld>
-    <p:spTree>
-      <p:nvGrpSpPr>
-        <p:cNvPr id="1" name=""/>
-        <p:cNvGrpSpPr/>
-        <p:nvPr/>
-      </p:nvGrpSpPr>
-      <p:grpSpPr>
-        <a:xfrm>
-          <a:off x="0" y="0"/>
-          <a:ext cx="0" cy="0"/>
-          <a:chOff x="0" y="0"/>
-          <a:chExt cx="0" cy="0"/>
-        </a:xfrm>
-      </p:grpSpPr>
-      <p:sp>
-        <p:nvSpPr>
-          <p:cNvPr id="2" name="Title 1"/>
-          <p:cNvSpPr>
-            <a:spLocks noGrp="1"/>
-          </p:cNvSpPr>
-          <p:nvPr>
-            <p:ph type="title"/>
-          </p:nvPr>
-        </p:nvSpPr>
-        <p:spPr/>
-        <p:txBody>
-          <a:bodyPr/>
-          <a:lstStyle/>
-          <a:p>
-            <a:r>
-              <a:rPr lang="en-US" dirty="0" smtClean="0"/>
+              <a:rPr lang="en-US" dirty="0"/>
               <a:t>Capstone evaluation rubric</a:t>
             </a:r>
-            <a:endParaRPr lang="en-US" dirty="0"/>
           </a:p>
         </p:txBody>
       </p:sp>
@@ -5013,9 +3987,27 @@
                 <a:tableStyleId>{D7AC3CCA-C797-4891-BE02-D94E43425B78}</a:tableStyleId>
               </a:tblPr>
               <a:tblGrid>
-                <a:gridCol w="1368425"/>
-                <a:gridCol w="857250"/>
-                <a:gridCol w="3711575"/>
+                <a:gridCol w="1368425">
+                  <a:extLst>
+                    <a:ext uri="{9D8B030D-6E8A-4147-A177-3AD203B41FA5}">
+                      <a16:colId xmlns:a16="http://schemas.microsoft.com/office/drawing/2014/main" val="20000"/>
+                    </a:ext>
+                  </a:extLst>
+                </a:gridCol>
+                <a:gridCol w="857250">
+                  <a:extLst>
+                    <a:ext uri="{9D8B030D-6E8A-4147-A177-3AD203B41FA5}">
+                      <a16:colId xmlns:a16="http://schemas.microsoft.com/office/drawing/2014/main" val="20001"/>
+                    </a:ext>
+                  </a:extLst>
+                </a:gridCol>
+                <a:gridCol w="3711575">
+                  <a:extLst>
+                    <a:ext uri="{9D8B030D-6E8A-4147-A177-3AD203B41FA5}">
+                      <a16:colId xmlns:a16="http://schemas.microsoft.com/office/drawing/2014/main" val="20002"/>
+                    </a:ext>
+                  </a:extLst>
+                </a:gridCol>
               </a:tblGrid>
               <a:tr h="0">
                 <a:tc>
@@ -5102,6 +4094,11 @@
                   </a:txBody>
                   <a:tcPr marL="68580" marR="68580" marT="0" marB="0"/>
                 </a:tc>
+                <a:extLst>
+                  <a:ext uri="{0D108BD9-81ED-4DB2-BD59-A6C34878D82A}">
+                    <a16:rowId xmlns:a16="http://schemas.microsoft.com/office/drawing/2014/main" val="10000"/>
+                  </a:ext>
+                </a:extLst>
               </a:tr>
               <a:tr h="0">
                 <a:tc>
@@ -5188,6 +4185,11 @@
                   </a:txBody>
                   <a:tcPr marL="68580" marR="68580" marT="0" marB="0"/>
                 </a:tc>
+                <a:extLst>
+                  <a:ext uri="{0D108BD9-81ED-4DB2-BD59-A6C34878D82A}">
+                    <a16:rowId xmlns:a16="http://schemas.microsoft.com/office/drawing/2014/main" val="10001"/>
+                  </a:ext>
+                </a:extLst>
               </a:tr>
               <a:tr h="0">
                 <a:tc>
@@ -5274,6 +4276,11 @@
                   </a:txBody>
                   <a:tcPr marL="68580" marR="68580" marT="0" marB="0"/>
                 </a:tc>
+                <a:extLst>
+                  <a:ext uri="{0D108BD9-81ED-4DB2-BD59-A6C34878D82A}">
+                    <a16:rowId xmlns:a16="http://schemas.microsoft.com/office/drawing/2014/main" val="10002"/>
+                  </a:ext>
+                </a:extLst>
               </a:tr>
               <a:tr h="0">
                 <a:tc gridSpan="2">
@@ -5342,6 +4349,11 @@
                   </a:txBody>
                   <a:tcPr marL="68580" marR="68580" marT="0" marB="0"/>
                 </a:tc>
+                <a:extLst>
+                  <a:ext uri="{0D108BD9-81ED-4DB2-BD59-A6C34878D82A}">
+                    <a16:rowId xmlns:a16="http://schemas.microsoft.com/office/drawing/2014/main" val="10003"/>
+                  </a:ext>
+                </a:extLst>
               </a:tr>
               <a:tr h="0">
                 <a:tc gridSpan="2">
@@ -5410,6 +4422,11 @@
                   </a:txBody>
                   <a:tcPr marL="68580" marR="68580" marT="0" marB="0"/>
                 </a:tc>
+                <a:extLst>
+                  <a:ext uri="{0D108BD9-81ED-4DB2-BD59-A6C34878D82A}">
+                    <a16:rowId xmlns:a16="http://schemas.microsoft.com/office/drawing/2014/main" val="10004"/>
+                  </a:ext>
+                </a:extLst>
               </a:tr>
               <a:tr h="0">
                 <a:tc gridSpan="2">
@@ -5478,6 +4495,11 @@
                   </a:txBody>
                   <a:tcPr marL="68580" marR="68580" marT="0" marB="0"/>
                 </a:tc>
+                <a:extLst>
+                  <a:ext uri="{0D108BD9-81ED-4DB2-BD59-A6C34878D82A}">
+                    <a16:rowId xmlns:a16="http://schemas.microsoft.com/office/drawing/2014/main" val="10005"/>
+                  </a:ext>
+                </a:extLst>
               </a:tr>
               <a:tr h="0">
                 <a:tc gridSpan="2">
@@ -5546,6 +4568,11 @@
                   </a:txBody>
                   <a:tcPr marL="68580" marR="68580" marT="0" marB="0"/>
                 </a:tc>
+                <a:extLst>
+                  <a:ext uri="{0D108BD9-81ED-4DB2-BD59-A6C34878D82A}">
+                    <a16:rowId xmlns:a16="http://schemas.microsoft.com/office/drawing/2014/main" val="10006"/>
+                  </a:ext>
+                </a:extLst>
               </a:tr>
               <a:tr h="0">
                 <a:tc>
@@ -5632,6 +4659,11 @@
                   </a:txBody>
                   <a:tcPr marL="68580" marR="68580" marT="0" marB="0"/>
                 </a:tc>
+                <a:extLst>
+                  <a:ext uri="{0D108BD9-81ED-4DB2-BD59-A6C34878D82A}">
+                    <a16:rowId xmlns:a16="http://schemas.microsoft.com/office/drawing/2014/main" val="10007"/>
+                  </a:ext>
+                </a:extLst>
               </a:tr>
               <a:tr h="0">
                 <a:tc>
@@ -5718,6 +4750,11 @@
                   </a:txBody>
                   <a:tcPr marL="68580" marR="68580" marT="0" marB="0"/>
                 </a:tc>
+                <a:extLst>
+                  <a:ext uri="{0D108BD9-81ED-4DB2-BD59-A6C34878D82A}">
+                    <a16:rowId xmlns:a16="http://schemas.microsoft.com/office/drawing/2014/main" val="10008"/>
+                  </a:ext>
+                </a:extLst>
               </a:tr>
             </a:tbl>
           </a:graphicData>
@@ -5733,13 +4770,184 @@
   <p:clrMapOvr>
     <a:masterClrMapping/>
   </p:clrMapOvr>
-  <p:timing>
-    <p:tnLst>
-      <p:par>
-        <p:cTn id="1" dur="indefinite" restart="never" nodeType="tmRoot"/>
-      </p:par>
-    </p:tnLst>
-  </p:timing>
+</p:sld>
+</file>
+
+<file path=ppt/slides/slide3.xml><?xml version="1.0" encoding="utf-8"?>
+<p:sld xmlns:a="http://schemas.openxmlformats.org/drawingml/2006/main" xmlns:r="http://schemas.openxmlformats.org/officeDocument/2006/relationships" xmlns:p="http://schemas.openxmlformats.org/presentationml/2006/main">
+  <p:cSld>
+    <p:spTree>
+      <p:nvGrpSpPr>
+        <p:cNvPr id="1" name=""/>
+        <p:cNvGrpSpPr/>
+        <p:nvPr/>
+      </p:nvGrpSpPr>
+      <p:grpSpPr>
+        <a:xfrm>
+          <a:off x="0" y="0"/>
+          <a:ext cx="0" cy="0"/>
+          <a:chOff x="0" y="0"/>
+          <a:chExt cx="0" cy="0"/>
+        </a:xfrm>
+      </p:grpSpPr>
+      <p:sp>
+        <p:nvSpPr>
+          <p:cNvPr id="2" name="Title 1"/>
+          <p:cNvSpPr>
+            <a:spLocks noGrp="1"/>
+          </p:cNvSpPr>
+          <p:nvPr>
+            <p:ph type="title"/>
+          </p:nvPr>
+        </p:nvSpPr>
+        <p:spPr/>
+        <p:txBody>
+          <a:bodyPr/>
+          <a:lstStyle/>
+          <a:p>
+            <a:r>
+              <a:rPr lang="en-US" dirty="0"/>
+              <a:t>Deliverables for week 1</a:t>
+            </a:r>
+          </a:p>
+        </p:txBody>
+      </p:sp>
+      <p:sp>
+        <p:nvSpPr>
+          <p:cNvPr id="3" name="Content Placeholder 2"/>
+          <p:cNvSpPr>
+            <a:spLocks noGrp="1"/>
+          </p:cNvSpPr>
+          <p:nvPr>
+            <p:ph idx="1"/>
+          </p:nvPr>
+        </p:nvSpPr>
+        <p:spPr/>
+        <p:txBody>
+          <a:bodyPr>
+            <a:normAutofit/>
+          </a:bodyPr>
+          <a:lstStyle/>
+          <a:p>
+            <a:pPr>
+              <a:spcBef>
+                <a:spcPts val="800"/>
+              </a:spcBef>
+              <a:buFont typeface="Arial" charset="0"/>
+              <a:buChar char="•"/>
+              <a:defRPr/>
+            </a:pPr>
+            <a:r>
+              <a:rPr lang="en-US" dirty="0">
+                <a:latin typeface="Calibri" charset="0"/>
+              </a:rPr>
+              <a:t>By next week, you will have</a:t>
+            </a:r>
+          </a:p>
+          <a:p>
+            <a:pPr lvl="1">
+              <a:spcBef>
+                <a:spcPts val="800"/>
+              </a:spcBef>
+              <a:buFont typeface="Arial" charset="0"/>
+              <a:buChar char="•"/>
+              <a:defRPr/>
+            </a:pPr>
+            <a:r>
+              <a:rPr lang="en-US" dirty="0">
+                <a:latin typeface="Calibri" charset="0"/>
+              </a:rPr>
+              <a:t>Created a GitHub org/repo</a:t>
+            </a:r>
+          </a:p>
+          <a:p>
+            <a:pPr lvl="2">
+              <a:spcBef>
+                <a:spcPts val="800"/>
+              </a:spcBef>
+              <a:buFont typeface="Arial" charset="0"/>
+              <a:buChar char="•"/>
+              <a:defRPr/>
+            </a:pPr>
+            <a:r>
+              <a:rPr lang="en-US" dirty="0">
+                <a:latin typeface="Calibri" charset="0"/>
+              </a:rPr>
+              <a:t>Put this info in Google sheet shared in #capstone2020</a:t>
+            </a:r>
+          </a:p>
+          <a:p>
+            <a:pPr lvl="1">
+              <a:spcBef>
+                <a:spcPts val="800"/>
+              </a:spcBef>
+              <a:buFont typeface="Arial" charset="0"/>
+              <a:buChar char="•"/>
+              <a:defRPr/>
+            </a:pPr>
+            <a:r>
+              <a:rPr lang="en-US" dirty="0">
+                <a:latin typeface="Calibri" charset="0"/>
+              </a:rPr>
+              <a:t>Negotiated a communications channel and frequency with the stakeholder / project sponsor</a:t>
+            </a:r>
+          </a:p>
+          <a:p>
+            <a:pPr lvl="1">
+              <a:spcBef>
+                <a:spcPts val="800"/>
+              </a:spcBef>
+              <a:buFont typeface="Arial" charset="0"/>
+              <a:buChar char="•"/>
+              <a:defRPr/>
+            </a:pPr>
+            <a:r>
+              <a:rPr lang="en-US" dirty="0">
+                <a:latin typeface="Calibri" charset="0"/>
+              </a:rPr>
+              <a:t>Reviewed the project proposal and begun a needs assessment / use case description </a:t>
+            </a:r>
+            <a:r>
+              <a:rPr lang="en-US" dirty="0" err="1">
+                <a:latin typeface="Calibri" charset="0"/>
+              </a:rPr>
+              <a:t>inc.</a:t>
+            </a:r>
+            <a:r>
+              <a:rPr lang="en-US" dirty="0">
+                <a:latin typeface="Calibri" charset="0"/>
+              </a:rPr>
+              <a:t> user stories</a:t>
+            </a:r>
+          </a:p>
+          <a:p>
+            <a:pPr lvl="1">
+              <a:spcBef>
+                <a:spcPts val="800"/>
+              </a:spcBef>
+              <a:buFont typeface="Arial" charset="0"/>
+              <a:buChar char="•"/>
+              <a:defRPr/>
+            </a:pPr>
+            <a:r>
+              <a:rPr lang="en-US" dirty="0">
+                <a:latin typeface="Calibri" charset="0"/>
+              </a:rPr>
+              <a:t>Sent the use case descriptions back to sponsor for review</a:t>
+            </a:r>
+          </a:p>
+        </p:txBody>
+      </p:sp>
+    </p:spTree>
+    <p:extLst>
+      <p:ext uri="{BB962C8B-B14F-4D97-AF65-F5344CB8AC3E}">
+        <p14:creationId xmlns:p14="http://schemas.microsoft.com/office/powerpoint/2010/main" val="922061992"/>
+      </p:ext>
+    </p:extLst>
+  </p:cSld>
+  <p:clrMapOvr>
+    <a:masterClrMapping/>
+  </p:clrMapOvr>
 </p:sld>
 </file>
 
@@ -5776,10 +4984,9 @@
           <a:lstStyle/>
           <a:p>
             <a:r>
-              <a:rPr lang="en-US" dirty="0" smtClean="0"/>
-              <a:t>Getting starting</a:t>
-            </a:r>
-            <a:endParaRPr lang="en-US" dirty="0"/>
+              <a:rPr lang="en-US" dirty="0"/>
+              <a:t>Deliverables for week 2</a:t>
+            </a:r>
           </a:p>
         </p:txBody>
       </p:sp>
@@ -5809,10 +5016,10 @@
               <a:defRPr/>
             </a:pPr>
             <a:r>
-              <a:rPr lang="en-US" dirty="0" smtClean="0">
+              <a:rPr lang="en-US" dirty="0">
                 <a:latin typeface="Calibri" charset="0"/>
               </a:rPr>
-              <a:t>Contact the sponsor</a:t>
+              <a:t>By the following week, you will have</a:t>
             </a:r>
           </a:p>
           <a:p>
@@ -5825,29 +5032,10 @@
               <a:defRPr/>
             </a:pPr>
             <a:r>
-              <a:rPr lang="en-US" dirty="0" smtClean="0">
+              <a:rPr lang="en-US" dirty="0">
                 <a:latin typeface="Calibri" charset="0"/>
               </a:rPr>
-              <a:t>Perform a needs assessment</a:t>
-            </a:r>
-            <a:endParaRPr lang="en-US" dirty="0">
-              <a:latin typeface="Calibri" charset="0"/>
-            </a:endParaRPr>
-          </a:p>
-          <a:p>
-            <a:pPr>
-              <a:spcBef>
-                <a:spcPts val="800"/>
-              </a:spcBef>
-              <a:buFont typeface="Arial" charset="0"/>
-              <a:buChar char="•"/>
-              <a:defRPr/>
-            </a:pPr>
-            <a:r>
-              <a:rPr lang="en-US" dirty="0" smtClean="0">
-                <a:latin typeface="Calibri" charset="0"/>
-              </a:rPr>
-              <a:t>Identify use cases</a:t>
+              <a:t>Attended Jim’s project planning Zoom at 3:30 PM 4/8</a:t>
             </a:r>
           </a:p>
           <a:p>
@@ -5860,14 +5048,14 @@
               <a:defRPr/>
             </a:pPr>
             <a:r>
-              <a:rPr lang="en-US" dirty="0" smtClean="0">
+              <a:rPr lang="en-US" dirty="0">
                 <a:latin typeface="Calibri" charset="0"/>
               </a:rPr>
-              <a:t>Send them to sponsor for review</a:t>
-            </a:r>
-          </a:p>
-          <a:p>
-            <a:pPr>
+              <a:t>Created a project management plan for the project</a:t>
+            </a:r>
+          </a:p>
+          <a:p>
+            <a:pPr lvl="1">
               <a:spcBef>
                 <a:spcPts val="800"/>
               </a:spcBef>
@@ -5876,14 +5064,14 @@
               <a:defRPr/>
             </a:pPr>
             <a:r>
-              <a:rPr lang="en-US" dirty="0" smtClean="0">
+              <a:rPr lang="en-US" dirty="0">
                 <a:latin typeface="Calibri" charset="0"/>
               </a:rPr>
-              <a:t>Develop component specification documents</a:t>
-            </a:r>
-          </a:p>
-          <a:p>
-            <a:pPr>
+              <a:t>Created a Gantt chart </a:t>
+            </a:r>
+          </a:p>
+          <a:p>
+            <a:pPr lvl="1">
               <a:spcBef>
                 <a:spcPts val="800"/>
               </a:spcBef>
@@ -5892,235 +5080,24 @@
               <a:defRPr/>
             </a:pPr>
             <a:r>
-              <a:rPr lang="en-US" dirty="0" smtClean="0">
+              <a:rPr lang="en-US" dirty="0">
                 <a:latin typeface="Calibri" charset="0"/>
               </a:rPr>
-              <a:t>Develop a Gantt chart of your time line</a:t>
-            </a:r>
-            <a:endParaRPr lang="en-US" dirty="0" smtClean="0">
-              <a:latin typeface="Calibri" charset="0"/>
-            </a:endParaRPr>
+              <a:t>Received go ahead on you refined use cases</a:t>
+            </a:r>
           </a:p>
         </p:txBody>
       </p:sp>
     </p:spTree>
     <p:extLst>
       <p:ext uri="{BB962C8B-B14F-4D97-AF65-F5344CB8AC3E}">
-        <p14:creationId xmlns:p14="http://schemas.microsoft.com/office/powerpoint/2010/main" val="1054370958"/>
+        <p14:creationId xmlns:p14="http://schemas.microsoft.com/office/powerpoint/2010/main" val="890881605"/>
       </p:ext>
     </p:extLst>
   </p:cSld>
   <p:clrMapOvr>
     <a:masterClrMapping/>
   </p:clrMapOvr>
-  <p:timing>
-    <p:tnLst>
-      <p:par>
-        <p:cTn id="1" dur="indefinite" restart="never" nodeType="tmRoot">
-          <p:childTnLst>
-            <p:seq concurrent="1" nextAc="seek">
-              <p:cTn id="2" dur="indefinite" nodeType="mainSeq">
-                <p:childTnLst>
-                  <p:par>
-                    <p:cTn id="3" fill="hold">
-                      <p:stCondLst>
-                        <p:cond delay="indefinite"/>
-                      </p:stCondLst>
-                      <p:childTnLst>
-                        <p:par>
-                          <p:cTn id="4" fill="hold">
-                            <p:stCondLst>
-                              <p:cond delay="0"/>
-                            </p:stCondLst>
-                            <p:childTnLst>
-                              <p:par>
-                                <p:cTn id="5" presetID="1" presetClass="entr" presetSubtype="0" fill="hold" nodeType="clickEffect">
-                                  <p:stCondLst>
-                                    <p:cond delay="0"/>
-                                  </p:stCondLst>
-                                  <p:childTnLst>
-                                    <p:set>
-                                      <p:cBhvr>
-                                        <p:cTn id="6" dur="1" fill="hold">
-                                          <p:stCondLst>
-                                            <p:cond delay="0"/>
-                                          </p:stCondLst>
-                                        </p:cTn>
-                                        <p:tgtEl>
-                                          <p:spTgt spid="3">
-                                            <p:txEl>
-                                              <p:pRg st="2" end="2"/>
-                                            </p:txEl>
-                                          </p:spTgt>
-                                        </p:tgtEl>
-                                        <p:attrNameLst>
-                                          <p:attrName>style.visibility</p:attrName>
-                                        </p:attrNameLst>
-                                      </p:cBhvr>
-                                      <p:to>
-                                        <p:strVal val="visible"/>
-                                      </p:to>
-                                    </p:set>
-                                  </p:childTnLst>
-                                </p:cTn>
-                              </p:par>
-                              <p:par>
-                                <p:cTn id="7" presetID="1" presetClass="entr" presetSubtype="0" fill="hold" nodeType="withEffect">
-                                  <p:stCondLst>
-                                    <p:cond delay="0"/>
-                                  </p:stCondLst>
-                                  <p:childTnLst>
-                                    <p:set>
-                                      <p:cBhvr>
-                                        <p:cTn id="8" dur="1" fill="hold">
-                                          <p:stCondLst>
-                                            <p:cond delay="0"/>
-                                          </p:stCondLst>
-                                        </p:cTn>
-                                        <p:tgtEl>
-                                          <p:spTgt spid="3">
-                                            <p:txEl>
-                                              <p:pRg st="3" end="3"/>
-                                            </p:txEl>
-                                          </p:spTgt>
-                                        </p:tgtEl>
-                                        <p:attrNameLst>
-                                          <p:attrName>style.visibility</p:attrName>
-                                        </p:attrNameLst>
-                                      </p:cBhvr>
-                                      <p:to>
-                                        <p:strVal val="visible"/>
-                                      </p:to>
-                                    </p:set>
-                                  </p:childTnLst>
-                                </p:cTn>
-                              </p:par>
-                            </p:childTnLst>
-                          </p:cTn>
-                        </p:par>
-                      </p:childTnLst>
-                    </p:cTn>
-                  </p:par>
-                  <p:par>
-                    <p:cTn id="9" fill="hold">
-                      <p:stCondLst>
-                        <p:cond delay="indefinite"/>
-                      </p:stCondLst>
-                      <p:childTnLst>
-                        <p:par>
-                          <p:cTn id="10" fill="hold">
-                            <p:stCondLst>
-                              <p:cond delay="0"/>
-                            </p:stCondLst>
-                            <p:childTnLst>
-                              <p:par>
-                                <p:cTn id="11" presetID="1" presetClass="entr" presetSubtype="0" fill="hold" nodeType="clickEffect">
-                                  <p:stCondLst>
-                                    <p:cond delay="0"/>
-                                  </p:stCondLst>
-                                  <p:childTnLst>
-                                    <p:set>
-                                      <p:cBhvr>
-                                        <p:cTn id="12" dur="1" fill="hold">
-                                          <p:stCondLst>
-                                            <p:cond delay="0"/>
-                                          </p:stCondLst>
-                                        </p:cTn>
-                                        <p:tgtEl>
-                                          <p:spTgt spid="3">
-                                            <p:txEl>
-                                              <p:pRg st="4" end="4"/>
-                                            </p:txEl>
-                                          </p:spTgt>
-                                        </p:tgtEl>
-                                        <p:attrNameLst>
-                                          <p:attrName>style.visibility</p:attrName>
-                                        </p:attrNameLst>
-                                      </p:cBhvr>
-                                      <p:to>
-                                        <p:strVal val="visible"/>
-                                      </p:to>
-                                    </p:set>
-                                  </p:childTnLst>
-                                </p:cTn>
-                              </p:par>
-                            </p:childTnLst>
-                          </p:cTn>
-                        </p:par>
-                      </p:childTnLst>
-                    </p:cTn>
-                  </p:par>
-                  <p:par>
-                    <p:cTn id="13" fill="hold">
-                      <p:stCondLst>
-                        <p:cond delay="indefinite"/>
-                      </p:stCondLst>
-                      <p:childTnLst>
-                        <p:par>
-                          <p:cTn id="14" fill="hold">
-                            <p:stCondLst>
-                              <p:cond delay="0"/>
-                            </p:stCondLst>
-                            <p:childTnLst>
-                              <p:par>
-                                <p:cTn id="15" presetID="1" presetClass="entr" presetSubtype="0" fill="hold" nodeType="clickEffect">
-                                  <p:stCondLst>
-                                    <p:cond delay="0"/>
-                                  </p:stCondLst>
-                                  <p:childTnLst>
-                                    <p:set>
-                                      <p:cBhvr>
-                                        <p:cTn id="16" dur="1" fill="hold">
-                                          <p:stCondLst>
-                                            <p:cond delay="0"/>
-                                          </p:stCondLst>
-                                        </p:cTn>
-                                        <p:tgtEl>
-                                          <p:spTgt spid="3">
-                                            <p:txEl>
-                                              <p:pRg st="5" end="5"/>
-                                            </p:txEl>
-                                          </p:spTgt>
-                                        </p:tgtEl>
-                                        <p:attrNameLst>
-                                          <p:attrName>style.visibility</p:attrName>
-                                        </p:attrNameLst>
-                                      </p:cBhvr>
-                                      <p:to>
-                                        <p:strVal val="visible"/>
-                                      </p:to>
-                                    </p:set>
-                                  </p:childTnLst>
-                                </p:cTn>
-                              </p:par>
-                            </p:childTnLst>
-                          </p:cTn>
-                        </p:par>
-                      </p:childTnLst>
-                    </p:cTn>
-                  </p:par>
-                </p:childTnLst>
-              </p:cTn>
-              <p:prevCondLst>
-                <p:cond evt="onPrev" delay="0">
-                  <p:tgtEl>
-                    <p:sldTgt/>
-                  </p:tgtEl>
-                </p:cond>
-              </p:prevCondLst>
-              <p:nextCondLst>
-                <p:cond evt="onNext" delay="0">
-                  <p:tgtEl>
-                    <p:sldTgt/>
-                  </p:tgtEl>
-                </p:cond>
-              </p:nextCondLst>
-            </p:seq>
-          </p:childTnLst>
-        </p:cTn>
-      </p:par>
-    </p:tnLst>
-  </p:timing>
 </p:sld>
 </file>
 
@@ -6157,10 +5134,9 @@
           <a:lstStyle/>
           <a:p>
             <a:r>
-              <a:rPr lang="en-US" dirty="0" smtClean="0"/>
-              <a:t>Contacting the sponsor</a:t>
-            </a:r>
-            <a:endParaRPr lang="en-US" dirty="0"/>
+              <a:rPr lang="en-US" dirty="0"/>
+              <a:t>For the next two weeks</a:t>
+            </a:r>
           </a:p>
         </p:txBody>
       </p:sp>
@@ -6174,12 +5150,7 @@
             <p:ph idx="1"/>
           </p:nvPr>
         </p:nvSpPr>
-        <p:spPr>
-          <a:xfrm>
-            <a:off x="166255" y="1600200"/>
-            <a:ext cx="3560618" cy="5057172"/>
-          </a:xfrm>
-        </p:spPr>
+        <p:spPr/>
         <p:txBody>
           <a:bodyPr>
             <a:normAutofit/>
@@ -6195,117 +5166,100 @@
               <a:defRPr/>
             </a:pPr>
             <a:r>
-              <a:rPr lang="en-US" dirty="0" smtClean="0">
+              <a:rPr lang="en-US" dirty="0">
                 <a:latin typeface="Calibri" charset="0"/>
               </a:rPr>
-              <a:t>Start by contacting your sponsor and setting up a </a:t>
-            </a:r>
-            <a:r>
-              <a:rPr lang="en-US" b="1" dirty="0" smtClean="0">
+              <a:t>Team name &amp; logo (nail down the important stuff)</a:t>
+            </a:r>
+          </a:p>
+          <a:p>
+            <a:pPr>
+              <a:spcBef>
+                <a:spcPts val="800"/>
+              </a:spcBef>
+              <a:buFont typeface="Arial" charset="0"/>
+              <a:buChar char="•"/>
+              <a:defRPr/>
+            </a:pPr>
+            <a:r>
+              <a:rPr lang="en-US" dirty="0">
                 <a:latin typeface="Calibri" charset="0"/>
               </a:rPr>
-              <a:t>face to face </a:t>
-            </a:r>
-            <a:r>
-              <a:rPr lang="en-US" dirty="0" smtClean="0">
+              <a:t>Get the approved use cases and develop component specifications</a:t>
+            </a:r>
+          </a:p>
+          <a:p>
+            <a:pPr>
+              <a:spcBef>
+                <a:spcPts val="800"/>
+              </a:spcBef>
+              <a:buFont typeface="Arial" charset="0"/>
+              <a:buChar char="•"/>
+              <a:defRPr/>
+            </a:pPr>
+            <a:r>
+              <a:rPr lang="en-US" dirty="0">
                 <a:latin typeface="Calibri" charset="0"/>
               </a:rPr>
-              <a:t>meeting or </a:t>
-            </a:r>
-            <a:r>
-              <a:rPr lang="en-US" b="1" dirty="0" smtClean="0">
+              <a:t>Start your repo structure right from the beginning</a:t>
+            </a:r>
+          </a:p>
+          <a:p>
+            <a:pPr>
+              <a:spcBef>
+                <a:spcPts val="800"/>
+              </a:spcBef>
+              <a:buFont typeface="Arial" charset="0"/>
+              <a:buChar char="•"/>
+              <a:defRPr/>
+            </a:pPr>
+            <a:r>
+              <a:rPr lang="en-US" dirty="0">
                 <a:latin typeface="Calibri" charset="0"/>
               </a:rPr>
-              <a:t>Skype call </a:t>
-            </a:r>
-            <a:r>
-              <a:rPr lang="en-US" u="sng" dirty="0" smtClean="0">
+              <a:t>Start using PEP8 right from the beginning </a:t>
+            </a:r>
+          </a:p>
+          <a:p>
+            <a:pPr>
+              <a:spcBef>
+                <a:spcPts val="800"/>
+              </a:spcBef>
+              <a:buFont typeface="Arial" charset="0"/>
+              <a:buChar char="•"/>
+              <a:defRPr/>
+            </a:pPr>
+            <a:r>
+              <a:rPr lang="en-US" dirty="0">
                 <a:latin typeface="Calibri" charset="0"/>
               </a:rPr>
-              <a:t>before next week</a:t>
-            </a:r>
-            <a:endParaRPr lang="en-US" u="sng" dirty="0" smtClean="0">
+              <a:t>Use test driven development from the beginning</a:t>
+            </a:r>
+          </a:p>
+          <a:p>
+            <a:pPr>
+              <a:spcBef>
+                <a:spcPts val="800"/>
+              </a:spcBef>
+              <a:buFont typeface="Arial" charset="0"/>
+              <a:buChar char="•"/>
+              <a:defRPr/>
+            </a:pPr>
+            <a:endParaRPr lang="en-US" dirty="0">
               <a:latin typeface="Calibri" charset="0"/>
             </a:endParaRPr>
           </a:p>
-        </p:txBody>
-      </p:sp>
-      <p:pic>
-        <p:nvPicPr>
-          <p:cNvPr id="4" name="Picture 3"/>
-          <p:cNvPicPr>
-            <a:picLocks noChangeAspect="1"/>
-          </p:cNvPicPr>
-          <p:nvPr/>
-        </p:nvPicPr>
-        <p:blipFill rotWithShape="1">
-          <a:blip r:embed="rId2"/>
-          <a:srcRect b="19798"/>
-          <a:stretch/>
-        </p:blipFill>
-        <p:spPr>
-          <a:xfrm>
-            <a:off x="3844127" y="1600200"/>
-            <a:ext cx="5160017" cy="5057172"/>
-          </a:xfrm>
-          <a:prstGeom prst="rect">
-            <a:avLst/>
-          </a:prstGeom>
-        </p:spPr>
-      </p:pic>
-      <p:sp>
-        <p:nvSpPr>
-          <p:cNvPr id="5" name="Rectangle 4"/>
-          <p:cNvSpPr/>
-          <p:nvPr/>
-        </p:nvSpPr>
-        <p:spPr>
-          <a:xfrm>
-            <a:off x="3844127" y="1600200"/>
-            <a:ext cx="5160017" cy="3387436"/>
-          </a:xfrm>
-          <a:prstGeom prst="rect">
-            <a:avLst/>
-          </a:prstGeom>
-          <a:solidFill>
-            <a:schemeClr val="bg1"/>
-          </a:solidFill>
-          <a:ln>
-            <a:noFill/>
-          </a:ln>
-          <a:effectLst/>
-        </p:spPr>
-        <p:style>
-          <a:lnRef idx="1">
-            <a:schemeClr val="accent1"/>
-          </a:lnRef>
-          <a:fillRef idx="3">
-            <a:schemeClr val="accent1"/>
-          </a:fillRef>
-          <a:effectRef idx="2">
-            <a:schemeClr val="accent1"/>
-          </a:effectRef>
-          <a:fontRef idx="minor">
-            <a:schemeClr val="lt1"/>
-          </a:fontRef>
-        </p:style>
-        <p:txBody>
-          <a:bodyPr rtlCol="0" anchor="b"/>
-          <a:lstStyle/>
-          <a:p>
-            <a:pPr algn="ctr"/>
-            <a:r>
-              <a:rPr lang="en-US" sz="2800" b="1" dirty="0" smtClean="0">
-                <a:solidFill>
-                  <a:schemeClr val="tx1"/>
-                </a:solidFill>
-              </a:rPr>
-              <a:t>Guidelines for contacting your project sponsor</a:t>
-            </a:r>
-            <a:endParaRPr lang="en-US" sz="2800" b="1" dirty="0">
-              <a:solidFill>
-                <a:schemeClr val="tx1"/>
-              </a:solidFill>
+          <a:p>
+            <a:pPr>
+              <a:spcBef>
+                <a:spcPts val="800"/>
+              </a:spcBef>
+              <a:buFont typeface="Arial" charset="0"/>
+              <a:buChar char="•"/>
+              <a:defRPr/>
+            </a:pPr>
+            <a:endParaRPr lang="en-US" dirty="0">
+              <a:latin typeface="Calibri" charset="0"/>
             </a:endParaRPr>
           </a:p>
         </p:txBody>
@@ -6313,91 +5267,13 @@
     </p:spTree>
     <p:extLst>
       <p:ext uri="{BB962C8B-B14F-4D97-AF65-F5344CB8AC3E}">
-        <p14:creationId xmlns:p14="http://schemas.microsoft.com/office/powerpoint/2010/main" val="822534208"/>
+        <p14:creationId xmlns:p14="http://schemas.microsoft.com/office/powerpoint/2010/main" val="31892066"/>
       </p:ext>
     </p:extLst>
   </p:cSld>
   <p:clrMapOvr>
     <a:masterClrMapping/>
   </p:clrMapOvr>
-  <p:timing>
-    <p:tnLst>
-      <p:par>
-        <p:cTn id="1" dur="indefinite" restart="never" nodeType="tmRoot">
-          <p:childTnLst>
-            <p:seq concurrent="1" nextAc="seek">
-              <p:cTn id="2" dur="indefinite" nodeType="mainSeq">
-                <p:childTnLst>
-                  <p:par>
-                    <p:cTn id="3" fill="hold">
-                      <p:stCondLst>
-                        <p:cond delay="indefinite"/>
-                      </p:stCondLst>
-                      <p:childTnLst>
-                        <p:par>
-                          <p:cTn id="4" fill="hold">
-                            <p:stCondLst>
-                              <p:cond delay="0"/>
-                            </p:stCondLst>
-                            <p:childTnLst>
-                              <p:par>
-                                <p:cTn id="5" presetID="1" presetClass="exit" presetSubtype="0" fill="hold" grpId="0" nodeType="clickEffect">
-                                  <p:stCondLst>
-                                    <p:cond delay="0"/>
-                                  </p:stCondLst>
-                                  <p:childTnLst>
-                                    <p:set>
-                                      <p:cBhvr>
-                                        <p:cTn id="6" dur="1" fill="hold">
-                                          <p:stCondLst>
-                                            <p:cond delay="0"/>
-                                          </p:stCondLst>
-                                        </p:cTn>
-                                        <p:tgtEl>
-                                          <p:spTgt spid="5"/>
-                                        </p:tgtEl>
-                                        <p:attrNameLst>
-                                          <p:attrName>style.visibility</p:attrName>
-                                        </p:attrNameLst>
-                                      </p:cBhvr>
-                                      <p:to>
-                                        <p:strVal val="hidden"/>
-                                      </p:to>
-                                    </p:set>
-                                  </p:childTnLst>
-                                </p:cTn>
-                              </p:par>
-                            </p:childTnLst>
-                          </p:cTn>
-                        </p:par>
-                      </p:childTnLst>
-                    </p:cTn>
-                  </p:par>
-                </p:childTnLst>
-              </p:cTn>
-              <p:prevCondLst>
-                <p:cond evt="onPrev" delay="0">
-                  <p:tgtEl>
-                    <p:sldTgt/>
-                  </p:tgtEl>
-                </p:cond>
-              </p:prevCondLst>
-              <p:nextCondLst>
-                <p:cond evt="onNext" delay="0">
-                  <p:tgtEl>
-                    <p:sldTgt/>
-                  </p:tgtEl>
-                </p:cond>
-              </p:nextCondLst>
-            </p:seq>
-          </p:childTnLst>
-        </p:cTn>
-      </p:par>
-    </p:tnLst>
-    <p:bldLst>
-      <p:bldP spid="5" grpId="0" animBg="1"/>
-    </p:bldLst>
-  </p:timing>
 </p:sld>
 </file>
 
@@ -6434,10 +5310,9 @@
           <a:lstStyle/>
           <a:p>
             <a:r>
-              <a:rPr lang="en-US" dirty="0" smtClean="0"/>
-              <a:t>Standups begin next week</a:t>
-            </a:r>
-            <a:endParaRPr lang="en-US" dirty="0"/>
+              <a:rPr lang="en-US" dirty="0"/>
+              <a:t>For the future</a:t>
+            </a:r>
           </a:p>
         </p:txBody>
       </p:sp>
@@ -6467,579 +5342,10 @@
               <a:defRPr/>
             </a:pPr>
             <a:r>
-              <a:rPr lang="en-US" dirty="0" smtClean="0">
+              <a:rPr lang="en-US" dirty="0">
                 <a:latin typeface="Calibri" charset="0"/>
               </a:rPr>
-              <a:t>You will follow the normal </a:t>
-            </a:r>
-            <a:r>
-              <a:rPr lang="en-US" smtClean="0">
-                <a:latin typeface="Calibri" charset="0"/>
-              </a:rPr>
-              <a:t>standup protocol</a:t>
-            </a:r>
-            <a:endParaRPr lang="en-US" dirty="0" smtClean="0">
-              <a:latin typeface="Calibri" charset="0"/>
-            </a:endParaRPr>
-          </a:p>
-        </p:txBody>
-      </p:sp>
-    </p:spTree>
-    <p:extLst>
-      <p:ext uri="{BB962C8B-B14F-4D97-AF65-F5344CB8AC3E}">
-        <p14:creationId xmlns:p14="http://schemas.microsoft.com/office/powerpoint/2010/main" val="842696282"/>
-      </p:ext>
-    </p:extLst>
-  </p:cSld>
-  <p:clrMapOvr>
-    <a:masterClrMapping/>
-  </p:clrMapOvr>
-  <p:timing>
-    <p:tnLst>
-      <p:par>
-        <p:cTn id="1" dur="indefinite" restart="never" nodeType="tmRoot"/>
-      </p:par>
-    </p:tnLst>
-  </p:timing>
-</p:sld>
-</file>
-
-<file path=ppt/slides/slide7.xml><?xml version="1.0" encoding="utf-8"?>
-<p:sld xmlns:a="http://schemas.openxmlformats.org/drawingml/2006/main" xmlns:r="http://schemas.openxmlformats.org/officeDocument/2006/relationships" xmlns:p="http://schemas.openxmlformats.org/presentationml/2006/main">
-  <p:cSld>
-    <p:spTree>
-      <p:nvGrpSpPr>
-        <p:cNvPr id="1" name="Shape 411"/>
-        <p:cNvGrpSpPr/>
-        <p:nvPr/>
-      </p:nvGrpSpPr>
-      <p:grpSpPr>
-        <a:xfrm>
-          <a:off x="0" y="0"/>
-          <a:ext cx="0" cy="0"/>
-          <a:chOff x="0" y="0"/>
-          <a:chExt cx="0" cy="0"/>
-        </a:xfrm>
-      </p:grpSpPr>
-      <p:sp>
-        <p:nvSpPr>
-          <p:cNvPr id="412" name="Shape 412"/>
-          <p:cNvSpPr txBox="1">
-            <a:spLocks noGrp="1"/>
-          </p:cNvSpPr>
-          <p:nvPr>
-            <p:ph type="title"/>
-          </p:nvPr>
-        </p:nvSpPr>
-        <p:spPr>
-          <a:xfrm>
-            <a:off x="457200" y="381000"/>
-            <a:ext cx="8229600" cy="838199"/>
-          </a:xfrm>
-          <a:prstGeom prst="rect">
-            <a:avLst/>
-          </a:prstGeom>
-          <a:noFill/>
-          <a:ln>
-            <a:noFill/>
-          </a:ln>
-        </p:spPr>
-        <p:txBody>
-          <a:bodyPr lIns="91425" tIns="45700" rIns="91425" bIns="45700" anchor="t" anchorCtr="0">
-            <a:noAutofit/>
-          </a:bodyPr>
-          <a:lstStyle/>
-          <a:p>
-            <a:pPr marL="0" marR="0" lvl="0" indent="0" algn="ctr" rtl="0">
-              <a:lnSpc>
-                <a:spcPct val="100000"/>
-              </a:lnSpc>
-              <a:spcBef>
-                <a:spcPts val="0"/>
-              </a:spcBef>
-              <a:spcAft>
-                <a:spcPts val="0"/>
-              </a:spcAft>
-              <a:buClr>
-                <a:schemeClr val="dk1"/>
-              </a:buClr>
-              <a:buSzPct val="25000"/>
-              <a:buFont typeface="Calibri"/>
-              <a:buNone/>
-            </a:pPr>
-            <a:r>
-              <a:rPr lang="en-US" sz="3600" b="1" i="0" u="none" strike="noStrike" cap="none">
-                <a:solidFill>
-                  <a:schemeClr val="dk1"/>
-                </a:solidFill>
-                <a:latin typeface="Calibri"/>
-                <a:ea typeface="Calibri"/>
-                <a:cs typeface="Calibri"/>
-                <a:sym typeface="Calibri"/>
-              </a:rPr>
-              <a:t>Standup Template</a:t>
-            </a:r>
-          </a:p>
-        </p:txBody>
-      </p:sp>
-      <p:sp>
-        <p:nvSpPr>
-          <p:cNvPr id="413" name="Shape 413"/>
-          <p:cNvSpPr txBox="1">
-            <a:spLocks noGrp="1"/>
-          </p:cNvSpPr>
-          <p:nvPr>
-            <p:ph type="body" idx="1"/>
-          </p:nvPr>
-        </p:nvSpPr>
-        <p:spPr>
-          <a:xfrm>
-            <a:off x="304800" y="1474692"/>
-            <a:ext cx="8458200" cy="1066799"/>
-          </a:xfrm>
-          <a:prstGeom prst="rect">
-            <a:avLst/>
-          </a:prstGeom>
-          <a:noFill/>
-          <a:ln>
-            <a:noFill/>
-          </a:ln>
-        </p:spPr>
-        <p:txBody>
-          <a:bodyPr lIns="91425" tIns="45700" rIns="91425" bIns="45700" anchor="t" anchorCtr="0">
-            <a:noAutofit/>
-          </a:bodyPr>
-          <a:lstStyle/>
-          <a:p>
-            <a:pPr marL="342900" marR="0" lvl="0" indent="-342900" algn="l" rtl="0">
-              <a:lnSpc>
-                <a:spcPct val="100000"/>
-              </a:lnSpc>
-              <a:spcBef>
-                <a:spcPts val="0"/>
-              </a:spcBef>
-              <a:spcAft>
-                <a:spcPts val="0"/>
-              </a:spcAft>
-              <a:buClr>
-                <a:schemeClr val="dk1"/>
-              </a:buClr>
-              <a:buSzPct val="100000"/>
-              <a:buFont typeface="Arial"/>
-              <a:buChar char="•"/>
-            </a:pPr>
-            <a:r>
-              <a:rPr lang="en-US" sz="2800" b="0" i="0" u="none">
-                <a:solidFill>
-                  <a:schemeClr val="dk1"/>
-                </a:solidFill>
-                <a:latin typeface="Calibri"/>
-                <a:ea typeface="Calibri"/>
-                <a:cs typeface="Calibri"/>
-                <a:sym typeface="Calibri"/>
-              </a:rPr>
-              <a:t>Why standups?</a:t>
-            </a:r>
-          </a:p>
-          <a:p>
-            <a:pPr marL="742950" marR="0" lvl="1" indent="-285750" algn="l" rtl="0">
-              <a:lnSpc>
-                <a:spcPct val="100000"/>
-              </a:lnSpc>
-              <a:spcBef>
-                <a:spcPts val="480"/>
-              </a:spcBef>
-              <a:spcAft>
-                <a:spcPts val="0"/>
-              </a:spcAft>
-              <a:buClr>
-                <a:schemeClr val="dk1"/>
-              </a:buClr>
-              <a:buSzPct val="100000"/>
-              <a:buFont typeface="Arial"/>
-              <a:buChar char="–"/>
-            </a:pPr>
-            <a:r>
-              <a:rPr lang="en-US" sz="2400" b="0" i="0" u="none" strike="noStrike" cap="none">
-                <a:solidFill>
-                  <a:schemeClr val="dk1"/>
-                </a:solidFill>
-                <a:latin typeface="Calibri"/>
-                <a:ea typeface="Calibri"/>
-                <a:cs typeface="Calibri"/>
-                <a:sym typeface="Calibri"/>
-              </a:rPr>
-              <a:t>Communicate status and actions within and between teams</a:t>
-            </a:r>
-          </a:p>
-          <a:p>
-            <a:pPr marL="342900" marR="0" lvl="0" indent="-342900" algn="l" rtl="0">
-              <a:lnSpc>
-                <a:spcPct val="100000"/>
-              </a:lnSpc>
-              <a:spcBef>
-                <a:spcPts val="560"/>
-              </a:spcBef>
-              <a:spcAft>
-                <a:spcPts val="0"/>
-              </a:spcAft>
-              <a:buClr>
-                <a:schemeClr val="dk1"/>
-              </a:buClr>
-              <a:buSzPct val="100000"/>
-              <a:buFont typeface="Arial"/>
-              <a:buChar char="•"/>
-            </a:pPr>
-            <a:r>
-              <a:rPr lang="en-US" sz="2800" b="0" i="0" u="none">
-                <a:solidFill>
-                  <a:schemeClr val="dk1"/>
-                </a:solidFill>
-                <a:latin typeface="Calibri"/>
-                <a:ea typeface="Calibri"/>
-                <a:cs typeface="Calibri"/>
-                <a:sym typeface="Calibri"/>
-              </a:rPr>
-              <a:t>Should be presented in 1-2 minutes</a:t>
-            </a:r>
-          </a:p>
-        </p:txBody>
-      </p:sp>
-      <p:sp>
-        <p:nvSpPr>
-          <p:cNvPr id="415" name="Shape 415"/>
-          <p:cNvSpPr txBox="1"/>
-          <p:nvPr/>
-        </p:nvSpPr>
-        <p:spPr>
-          <a:xfrm>
-            <a:off x="457200" y="3151092"/>
-            <a:ext cx="8229600" cy="3200399"/>
-          </a:xfrm>
-          <a:prstGeom prst="rect">
-            <a:avLst/>
-          </a:prstGeom>
-          <a:solidFill>
-            <a:srgbClr val="D9D9D9"/>
-          </a:solidFill>
-          <a:ln>
-            <a:noFill/>
-          </a:ln>
-        </p:spPr>
-        <p:txBody>
-          <a:bodyPr lIns="91425" tIns="45700" rIns="91425" bIns="45700" anchor="t" anchorCtr="0">
-            <a:noAutofit/>
-          </a:bodyPr>
-          <a:lstStyle/>
-          <a:p>
-            <a:pPr marL="342900" marR="0" lvl="0" indent="-342900" algn="l" rtl="0">
-              <a:lnSpc>
-                <a:spcPct val="100000"/>
-              </a:lnSpc>
-              <a:spcBef>
-                <a:spcPts val="0"/>
-              </a:spcBef>
-              <a:spcAft>
-                <a:spcPts val="0"/>
-              </a:spcAft>
-              <a:buClr>
-                <a:schemeClr val="dk1"/>
-              </a:buClr>
-              <a:buSzPct val="100000"/>
-              <a:buFont typeface="Arial"/>
-              <a:buChar char="•"/>
-            </a:pPr>
-            <a:r>
-              <a:rPr lang="en-US" sz="2800" b="0" i="0" u="none" dirty="0">
-                <a:solidFill>
-                  <a:schemeClr val="dk1"/>
-                </a:solidFill>
-                <a:latin typeface="Calibri"/>
-                <a:ea typeface="Calibri"/>
-                <a:cs typeface="Calibri"/>
-                <a:sym typeface="Calibri"/>
-              </a:rPr>
-              <a:t>Progress this period</a:t>
-            </a:r>
-          </a:p>
-          <a:p>
-            <a:pPr marL="742950" marR="0" lvl="1" indent="-285750" algn="l" rtl="0">
-              <a:lnSpc>
-                <a:spcPct val="100000"/>
-              </a:lnSpc>
-              <a:spcBef>
-                <a:spcPts val="480"/>
-              </a:spcBef>
-              <a:spcAft>
-                <a:spcPts val="0"/>
-              </a:spcAft>
-              <a:buClr>
-                <a:schemeClr val="dk1"/>
-              </a:buClr>
-              <a:buSzPct val="100000"/>
-              <a:buFont typeface="Arial"/>
-              <a:buChar char="–"/>
-            </a:pPr>
-            <a:r>
-              <a:rPr lang="en-US" sz="2400" b="0" i="0" u="none" strike="noStrike" cap="none" dirty="0">
-                <a:solidFill>
-                  <a:schemeClr val="dk1"/>
-                </a:solidFill>
-                <a:latin typeface="Calibri"/>
-                <a:ea typeface="Calibri"/>
-                <a:cs typeface="Calibri"/>
-                <a:sym typeface="Calibri"/>
-              </a:rPr>
-              <a:t>How it compares with the plan</a:t>
-            </a:r>
-          </a:p>
-          <a:p>
-            <a:pPr marL="742950" marR="0" lvl="1" indent="-285750" algn="l" rtl="0">
-              <a:lnSpc>
-                <a:spcPct val="100000"/>
-              </a:lnSpc>
-              <a:spcBef>
-                <a:spcPts val="480"/>
-              </a:spcBef>
-              <a:spcAft>
-                <a:spcPts val="0"/>
-              </a:spcAft>
-              <a:buClr>
-                <a:schemeClr val="dk1"/>
-              </a:buClr>
-              <a:buSzPct val="100000"/>
-              <a:buFont typeface="Arial"/>
-              <a:buChar char="–"/>
-            </a:pPr>
-            <a:r>
-              <a:rPr lang="en-US" sz="2400" b="0" i="0" u="none" strike="noStrike" cap="none" dirty="0">
-                <a:solidFill>
-                  <a:schemeClr val="dk1"/>
-                </a:solidFill>
-                <a:latin typeface="Calibri"/>
-                <a:ea typeface="Calibri"/>
-                <a:cs typeface="Calibri"/>
-                <a:sym typeface="Calibri"/>
-              </a:rPr>
-              <a:t>If behind plan, how compensate to make plan end date</a:t>
-            </a:r>
-          </a:p>
-          <a:p>
-            <a:pPr marL="342900" marR="0" lvl="0" indent="-342900" algn="l" rtl="0">
-              <a:lnSpc>
-                <a:spcPct val="100000"/>
-              </a:lnSpc>
-              <a:spcBef>
-                <a:spcPts val="560"/>
-              </a:spcBef>
-              <a:spcAft>
-                <a:spcPts val="0"/>
-              </a:spcAft>
-              <a:buClr>
-                <a:schemeClr val="dk1"/>
-              </a:buClr>
-              <a:buSzPct val="100000"/>
-              <a:buFont typeface="Arial"/>
-              <a:buChar char="•"/>
-            </a:pPr>
-            <a:r>
-              <a:rPr lang="en-US" sz="2800" b="0" i="0" u="none" dirty="0">
-                <a:solidFill>
-                  <a:schemeClr val="dk1"/>
-                </a:solidFill>
-                <a:latin typeface="Calibri"/>
-                <a:ea typeface="Calibri"/>
-                <a:cs typeface="Calibri"/>
-                <a:sym typeface="Calibri"/>
-              </a:rPr>
-              <a:t>Deliverables for next period</a:t>
-            </a:r>
-          </a:p>
-          <a:p>
-            <a:pPr marL="342900" marR="0" lvl="0" indent="-342900" algn="l" rtl="0">
-              <a:lnSpc>
-                <a:spcPct val="100000"/>
-              </a:lnSpc>
-              <a:spcBef>
-                <a:spcPts val="560"/>
-              </a:spcBef>
-              <a:spcAft>
-                <a:spcPts val="0"/>
-              </a:spcAft>
-              <a:buClr>
-                <a:schemeClr val="dk1"/>
-              </a:buClr>
-              <a:buSzPct val="100000"/>
-              <a:buFont typeface="Arial"/>
-              <a:buChar char="•"/>
-            </a:pPr>
-            <a:r>
-              <a:rPr lang="en-US" sz="2800" b="0" i="0" u="none" dirty="0">
-                <a:solidFill>
-                  <a:schemeClr val="dk1"/>
-                </a:solidFill>
-                <a:latin typeface="Calibri"/>
-                <a:ea typeface="Calibri"/>
-                <a:cs typeface="Calibri"/>
-                <a:sym typeface="Calibri"/>
-              </a:rPr>
-              <a:t>Challenges to making next deliverables such as:</a:t>
-            </a:r>
-          </a:p>
-          <a:p>
-            <a:pPr marL="742950" marR="0" lvl="1" indent="-285750" algn="l" rtl="0">
-              <a:lnSpc>
-                <a:spcPct val="100000"/>
-              </a:lnSpc>
-              <a:spcBef>
-                <a:spcPts val="480"/>
-              </a:spcBef>
-              <a:spcAft>
-                <a:spcPts val="0"/>
-              </a:spcAft>
-              <a:buClr>
-                <a:schemeClr val="dk1"/>
-              </a:buClr>
-              <a:buSzPct val="100000"/>
-              <a:buFont typeface="Arial"/>
-              <a:buChar char="–"/>
-            </a:pPr>
-            <a:r>
-              <a:rPr lang="en-US" sz="2400" b="0" i="0" u="none" strike="noStrike" cap="none" dirty="0">
-                <a:solidFill>
-                  <a:schemeClr val="dk1"/>
-                </a:solidFill>
-                <a:latin typeface="Calibri"/>
-                <a:ea typeface="Calibri"/>
-                <a:cs typeface="Calibri"/>
-                <a:sym typeface="Calibri"/>
-              </a:rPr>
-              <a:t>Technology uncertainties and blockers</a:t>
-            </a:r>
-          </a:p>
-          <a:p>
-            <a:pPr marL="742950" marR="0" lvl="1" indent="-285750" algn="l" rtl="0">
-              <a:lnSpc>
-                <a:spcPct val="100000"/>
-              </a:lnSpc>
-              <a:spcBef>
-                <a:spcPts val="480"/>
-              </a:spcBef>
-              <a:spcAft>
-                <a:spcPts val="0"/>
-              </a:spcAft>
-              <a:buClr>
-                <a:schemeClr val="dk1"/>
-              </a:buClr>
-              <a:buSzPct val="100000"/>
-              <a:buFont typeface="Arial"/>
-              <a:buChar char="–"/>
-            </a:pPr>
-            <a:r>
-              <a:rPr lang="en-US" sz="2400" b="0" i="0" u="none" strike="noStrike" cap="none" dirty="0">
-                <a:solidFill>
-                  <a:schemeClr val="dk1"/>
-                </a:solidFill>
-                <a:latin typeface="Calibri"/>
-                <a:ea typeface="Calibri"/>
-                <a:cs typeface="Calibri"/>
-                <a:sym typeface="Calibri"/>
-              </a:rPr>
-              <a:t>Team issues</a:t>
-            </a:r>
-          </a:p>
-        </p:txBody>
-      </p:sp>
-    </p:spTree>
-    <p:extLst>
-      <p:ext uri="{BB962C8B-B14F-4D97-AF65-F5344CB8AC3E}">
-        <p14:creationId xmlns:p14="http://schemas.microsoft.com/office/powerpoint/2010/main" val="1762989317"/>
-      </p:ext>
-    </p:extLst>
-  </p:cSld>
-  <p:clrMapOvr>
-    <a:masterClrMapping/>
-  </p:clrMapOvr>
-  <p:timing>
-    <p:tnLst>
-      <p:par>
-        <p:cTn id="1" dur="indefinite" restart="never" nodeType="tmRoot"/>
-      </p:par>
-    </p:tnLst>
-  </p:timing>
-</p:sld>
-</file>
-
-<file path=ppt/slides/slide8.xml><?xml version="1.0" encoding="utf-8"?>
-<p:sld xmlns:a="http://schemas.openxmlformats.org/drawingml/2006/main" xmlns:r="http://schemas.openxmlformats.org/officeDocument/2006/relationships" xmlns:p="http://schemas.openxmlformats.org/presentationml/2006/main">
-  <p:cSld>
-    <p:spTree>
-      <p:nvGrpSpPr>
-        <p:cNvPr id="1" name=""/>
-        <p:cNvGrpSpPr/>
-        <p:nvPr/>
-      </p:nvGrpSpPr>
-      <p:grpSpPr>
-        <a:xfrm>
-          <a:off x="0" y="0"/>
-          <a:ext cx="0" cy="0"/>
-          <a:chOff x="0" y="0"/>
-          <a:chExt cx="0" cy="0"/>
-        </a:xfrm>
-      </p:grpSpPr>
-      <p:sp>
-        <p:nvSpPr>
-          <p:cNvPr id="2" name="Title 1"/>
-          <p:cNvSpPr>
-            <a:spLocks noGrp="1"/>
-          </p:cNvSpPr>
-          <p:nvPr>
-            <p:ph type="title"/>
-          </p:nvPr>
-        </p:nvSpPr>
-        <p:spPr/>
-        <p:txBody>
-          <a:bodyPr/>
-          <a:lstStyle/>
-          <a:p>
-            <a:r>
-              <a:rPr lang="en-US" dirty="0" smtClean="0"/>
-              <a:t>Standups begin next week</a:t>
-            </a:r>
-            <a:endParaRPr lang="en-US" dirty="0"/>
-          </a:p>
-        </p:txBody>
-      </p:sp>
-      <p:sp>
-        <p:nvSpPr>
-          <p:cNvPr id="3" name="Content Placeholder 2"/>
-          <p:cNvSpPr>
-            <a:spLocks noGrp="1"/>
-          </p:cNvSpPr>
-          <p:nvPr>
-            <p:ph idx="1"/>
-          </p:nvPr>
-        </p:nvSpPr>
-        <p:spPr/>
-        <p:txBody>
-          <a:bodyPr>
-            <a:normAutofit/>
-          </a:bodyPr>
-          <a:lstStyle/>
-          <a:p>
-            <a:pPr>
-              <a:spcBef>
-                <a:spcPts val="800"/>
-              </a:spcBef>
-              <a:buFont typeface="Arial" charset="0"/>
-              <a:buChar char="•"/>
-              <a:defRPr/>
-            </a:pPr>
-            <a:r>
-              <a:rPr lang="en-US" dirty="0" smtClean="0">
-                <a:latin typeface="Calibri" charset="0"/>
-              </a:rPr>
-              <a:t>You will follow the normal standup protocol</a:t>
+              <a:t>Plan on doing some technology reviews</a:t>
             </a:r>
           </a:p>
           <a:p>
@@ -7065,250 +5371,10 @@
               <a:defRPr/>
             </a:pPr>
             <a:r>
-              <a:rPr lang="en-US" dirty="0" smtClean="0">
-                <a:latin typeface="Calibri" charset="0"/>
-              </a:rPr>
-              <a:t>You should have</a:t>
-            </a:r>
-          </a:p>
-          <a:p>
-            <a:pPr lvl="1">
-              <a:spcBef>
-                <a:spcPts val="800"/>
-              </a:spcBef>
-              <a:buFont typeface="Arial" charset="0"/>
-              <a:buChar char="•"/>
-              <a:defRPr/>
-            </a:pPr>
-            <a:r>
-              <a:rPr lang="en-US" dirty="0" smtClean="0">
-                <a:latin typeface="Calibri" charset="0"/>
-              </a:rPr>
-              <a:t>Created a GitHub repo*</a:t>
-            </a:r>
-            <a:endParaRPr lang="en-US" dirty="0" smtClean="0">
-              <a:latin typeface="Calibri" charset="0"/>
-            </a:endParaRPr>
-          </a:p>
-          <a:p>
-            <a:pPr lvl="1">
-              <a:spcBef>
-                <a:spcPts val="800"/>
-              </a:spcBef>
-              <a:buFont typeface="Arial" charset="0"/>
-              <a:buChar char="•"/>
-              <a:defRPr/>
-            </a:pPr>
-            <a:r>
               <a:rPr lang="en-US" dirty="0">
                 <a:latin typeface="Calibri" charset="0"/>
               </a:rPr>
-              <a:t>M</a:t>
-            </a:r>
-            <a:r>
-              <a:rPr lang="en-US" dirty="0" smtClean="0">
-                <a:latin typeface="Calibri" charset="0"/>
-              </a:rPr>
-              <a:t>et/spoken with your sponsor</a:t>
-            </a:r>
-          </a:p>
-          <a:p>
-            <a:pPr lvl="1">
-              <a:spcBef>
-                <a:spcPts val="800"/>
-              </a:spcBef>
-              <a:buFont typeface="Arial" charset="0"/>
-              <a:buChar char="•"/>
-              <a:defRPr/>
-            </a:pPr>
-            <a:r>
-              <a:rPr lang="en-US" dirty="0" smtClean="0">
-                <a:latin typeface="Calibri" charset="0"/>
-              </a:rPr>
-              <a:t>Developed use cases (put it in </a:t>
-            </a:r>
-            <a:r>
-              <a:rPr lang="en-US" dirty="0" err="1" smtClean="0">
-                <a:latin typeface="Calibri" charset="0"/>
-              </a:rPr>
-              <a:t>github</a:t>
-            </a:r>
-            <a:r>
-              <a:rPr lang="en-US" dirty="0" smtClean="0">
-                <a:latin typeface="Calibri" charset="0"/>
-              </a:rPr>
-              <a:t>)</a:t>
-            </a:r>
-          </a:p>
-          <a:p>
-            <a:pPr lvl="1">
-              <a:spcBef>
-                <a:spcPts val="800"/>
-              </a:spcBef>
-              <a:buFont typeface="Arial" charset="0"/>
-              <a:buChar char="•"/>
-              <a:defRPr/>
-            </a:pPr>
-            <a:r>
-              <a:rPr lang="en-US" dirty="0" smtClean="0">
-                <a:latin typeface="Calibri" charset="0"/>
-              </a:rPr>
-              <a:t>Created a Gantt chart (put it in </a:t>
-            </a:r>
-            <a:r>
-              <a:rPr lang="en-US" dirty="0" err="1" smtClean="0">
-                <a:latin typeface="Calibri" charset="0"/>
-              </a:rPr>
-              <a:t>github</a:t>
-            </a:r>
-            <a:r>
-              <a:rPr lang="en-US" dirty="0" smtClean="0">
-                <a:latin typeface="Calibri" charset="0"/>
-              </a:rPr>
-              <a:t>)</a:t>
-            </a:r>
-          </a:p>
-          <a:p>
-            <a:pPr lvl="1">
-              <a:spcBef>
-                <a:spcPts val="800"/>
-              </a:spcBef>
-              <a:buFont typeface="Arial" charset="0"/>
-              <a:buChar char="•"/>
-              <a:defRPr/>
-            </a:pPr>
-            <a:r>
-              <a:rPr lang="en-US" dirty="0" smtClean="0">
-                <a:latin typeface="Calibri" charset="0"/>
-              </a:rPr>
-              <a:t>Have sent the use cases back to the sponsor for review</a:t>
-            </a:r>
-            <a:endParaRPr lang="en-US" dirty="0" smtClean="0">
-              <a:latin typeface="Calibri" charset="0"/>
-            </a:endParaRPr>
-          </a:p>
-        </p:txBody>
-      </p:sp>
-      <p:sp>
-        <p:nvSpPr>
-          <p:cNvPr id="4" name="TextBox 3"/>
-          <p:cNvSpPr txBox="1"/>
-          <p:nvPr/>
-        </p:nvSpPr>
-        <p:spPr>
-          <a:xfrm>
-            <a:off x="4752109" y="6497782"/>
-            <a:ext cx="3664465" cy="369332"/>
-          </a:xfrm>
-          <a:prstGeom prst="rect">
-            <a:avLst/>
-          </a:prstGeom>
-          <a:noFill/>
-        </p:spPr>
-        <p:txBody>
-          <a:bodyPr wrap="none" rtlCol="0">
-            <a:spAutoFit/>
-          </a:bodyPr>
-          <a:lstStyle/>
-          <a:p>
-            <a:r>
-              <a:rPr lang="en-US" dirty="0" smtClean="0"/>
-              <a:t>* Remind me to explain this footnote</a:t>
-            </a:r>
-            <a:endParaRPr lang="en-US" dirty="0"/>
-          </a:p>
-        </p:txBody>
-      </p:sp>
-    </p:spTree>
-    <p:extLst>
-      <p:ext uri="{BB962C8B-B14F-4D97-AF65-F5344CB8AC3E}">
-        <p14:creationId xmlns:p14="http://schemas.microsoft.com/office/powerpoint/2010/main" val="922061992"/>
-      </p:ext>
-    </p:extLst>
-  </p:cSld>
-  <p:clrMapOvr>
-    <a:masterClrMapping/>
-  </p:clrMapOvr>
-  <p:timing>
-    <p:tnLst>
-      <p:par>
-        <p:cTn id="1" dur="indefinite" restart="never" nodeType="tmRoot"/>
-      </p:par>
-    </p:tnLst>
-  </p:timing>
-</p:sld>
-</file>
-
-<file path=ppt/slides/slide9.xml><?xml version="1.0" encoding="utf-8"?>
-<p:sld xmlns:a="http://schemas.openxmlformats.org/drawingml/2006/main" xmlns:r="http://schemas.openxmlformats.org/officeDocument/2006/relationships" xmlns:p="http://schemas.openxmlformats.org/presentationml/2006/main">
-  <p:cSld>
-    <p:spTree>
-      <p:nvGrpSpPr>
-        <p:cNvPr id="1" name=""/>
-        <p:cNvGrpSpPr/>
-        <p:nvPr/>
-      </p:nvGrpSpPr>
-      <p:grpSpPr>
-        <a:xfrm>
-          <a:off x="0" y="0"/>
-          <a:ext cx="0" cy="0"/>
-          <a:chOff x="0" y="0"/>
-          <a:chExt cx="0" cy="0"/>
-        </a:xfrm>
-      </p:grpSpPr>
-      <p:sp>
-        <p:nvSpPr>
-          <p:cNvPr id="2" name="Title 1"/>
-          <p:cNvSpPr>
-            <a:spLocks noGrp="1"/>
-          </p:cNvSpPr>
-          <p:nvPr>
-            <p:ph type="title"/>
-          </p:nvPr>
-        </p:nvSpPr>
-        <p:spPr/>
-        <p:txBody>
-          <a:bodyPr/>
-          <a:lstStyle/>
-          <a:p>
-            <a:r>
-              <a:rPr lang="en-US" dirty="0" smtClean="0"/>
-              <a:t>For the near future</a:t>
-            </a:r>
-            <a:endParaRPr lang="en-US" dirty="0"/>
-          </a:p>
-        </p:txBody>
-      </p:sp>
-      <p:sp>
-        <p:nvSpPr>
-          <p:cNvPr id="3" name="Content Placeholder 2"/>
-          <p:cNvSpPr>
-            <a:spLocks noGrp="1"/>
-          </p:cNvSpPr>
-          <p:nvPr>
-            <p:ph idx="1"/>
-          </p:nvPr>
-        </p:nvSpPr>
-        <p:spPr/>
-        <p:txBody>
-          <a:bodyPr>
-            <a:normAutofit lnSpcReduction="10000"/>
-          </a:bodyPr>
-          <a:lstStyle/>
-          <a:p>
-            <a:pPr>
-              <a:spcBef>
-                <a:spcPts val="800"/>
-              </a:spcBef>
-              <a:buFont typeface="Arial" charset="0"/>
-              <a:buChar char="•"/>
-              <a:defRPr/>
-            </a:pPr>
-            <a:r>
-              <a:rPr lang="en-US" dirty="0" smtClean="0">
-                <a:latin typeface="Calibri" charset="0"/>
-              </a:rPr>
-              <a:t>Get the approved use cases and develop component specifications</a:t>
+              <a:t>Identify your project coordination technology</a:t>
             </a:r>
           </a:p>
           <a:p>
@@ -7334,115 +5400,36 @@
               <a:defRPr/>
             </a:pPr>
             <a:r>
-              <a:rPr lang="en-US" dirty="0" smtClean="0">
+              <a:rPr lang="en-US" dirty="0">
                 <a:latin typeface="Calibri" charset="0"/>
               </a:rPr>
-              <a:t>Start your repo structure right from the beginning</a:t>
-            </a:r>
-          </a:p>
-          <a:p>
-            <a:pPr>
+              <a:t>How often will you meet?</a:t>
+            </a:r>
+          </a:p>
+          <a:p>
+            <a:pPr marL="0" indent="0">
               <a:spcBef>
                 <a:spcPts val="800"/>
               </a:spcBef>
-              <a:buFont typeface="Arial" charset="0"/>
-              <a:buChar char="•"/>
+              <a:buNone/>
               <a:defRPr/>
             </a:pPr>
             <a:endParaRPr lang="en-US" dirty="0">
               <a:latin typeface="Calibri" charset="0"/>
             </a:endParaRPr>
           </a:p>
-          <a:p>
-            <a:pPr>
-              <a:spcBef>
-                <a:spcPts val="800"/>
-              </a:spcBef>
-              <a:buFont typeface="Arial" charset="0"/>
-              <a:buChar char="•"/>
-              <a:defRPr/>
-            </a:pPr>
-            <a:r>
-              <a:rPr lang="en-US" dirty="0" smtClean="0">
-                <a:latin typeface="Calibri" charset="0"/>
-              </a:rPr>
-              <a:t>Start using PEP8 right from the beginning </a:t>
-            </a:r>
-          </a:p>
-          <a:p>
-            <a:pPr>
-              <a:spcBef>
-                <a:spcPts val="800"/>
-              </a:spcBef>
-              <a:buFont typeface="Arial" charset="0"/>
-              <a:buChar char="•"/>
-              <a:defRPr/>
-            </a:pPr>
-            <a:endParaRPr lang="en-US" dirty="0">
-              <a:latin typeface="Calibri" charset="0"/>
-            </a:endParaRPr>
-          </a:p>
-          <a:p>
-            <a:pPr>
-              <a:spcBef>
-                <a:spcPts val="800"/>
-              </a:spcBef>
-              <a:buFont typeface="Arial" charset="0"/>
-              <a:buChar char="•"/>
-              <a:defRPr/>
-            </a:pPr>
-            <a:r>
-              <a:rPr lang="en-US" dirty="0" smtClean="0">
-                <a:latin typeface="Calibri" charset="0"/>
-              </a:rPr>
-              <a:t>What else?....</a:t>
-            </a:r>
-          </a:p>
-          <a:p>
-            <a:pPr>
-              <a:spcBef>
-                <a:spcPts val="800"/>
-              </a:spcBef>
-              <a:buFont typeface="Arial" charset="0"/>
-              <a:buChar char="•"/>
-              <a:defRPr/>
-            </a:pPr>
-            <a:endParaRPr lang="en-US" dirty="0">
-              <a:latin typeface="Calibri" charset="0"/>
-            </a:endParaRPr>
-          </a:p>
-          <a:p>
-            <a:pPr>
-              <a:spcBef>
-                <a:spcPts val="800"/>
-              </a:spcBef>
-              <a:buFont typeface="Arial" charset="0"/>
-              <a:buChar char="•"/>
-              <a:defRPr/>
-            </a:pPr>
-            <a:endParaRPr lang="en-US" dirty="0" smtClean="0">
-              <a:latin typeface="Calibri" charset="0"/>
-            </a:endParaRPr>
-          </a:p>
         </p:txBody>
       </p:sp>
     </p:spTree>
     <p:extLst>
       <p:ext uri="{BB962C8B-B14F-4D97-AF65-F5344CB8AC3E}">
-        <p14:creationId xmlns:p14="http://schemas.microsoft.com/office/powerpoint/2010/main" val="31892066"/>
+        <p14:creationId xmlns:p14="http://schemas.microsoft.com/office/powerpoint/2010/main" val="1805174496"/>
       </p:ext>
     </p:extLst>
   </p:cSld>
   <p:clrMapOvr>
     <a:masterClrMapping/>
   </p:clrMapOvr>
-  <p:timing>
-    <p:tnLst>
-      <p:par>
-        <p:cTn id="1" dur="indefinite" restart="never" nodeType="tmRoot"/>
-      </p:par>
-    </p:tnLst>
-  </p:timing>
 </p:sld>
 </file>
 

</xml_diff>